<commit_message>
Adding CSD specific slide template for export
* generalized adding slides
* slight refactoring to remove dead code
</commit_message>
<xml_diff>
--- a/samples/pptx/sample.pptx
+++ b/samples/pptx/sample.pptx
@@ -1,6 +1,6 @@
 
 <file path=ppt/presentation.xml><?xml version="1.0" encoding="utf-8"?>
-<p:presentation xmlns:a="http://schemas.openxmlformats.org/drawingml/2006/main" xmlns:p="http://schemas.openxmlformats.org/presentationml/2006/main" xmlns:r="http://schemas.openxmlformats.org/officeDocument/2006/relationships" saveSubsetFonts="1">
+<p:presentation xmlns:a="http://schemas.openxmlformats.org/drawingml/2006/main" xmlns:r="http://schemas.openxmlformats.org/officeDocument/2006/relationships" xmlns:p="http://schemas.openxmlformats.org/presentationml/2006/main" saveSubsetFonts="1" autoCompressPictures="0">
   <p:sldMasterIdLst>
     <p:sldMasterId id="2147483648" r:id="rId1"/>
   </p:sldMasterIdLst>
@@ -12,15 +12,20 @@
     <p:sldId id="260" r:id="rId10"/>
     <p:sldId id="261" r:id="rId11"/>
     <p:sldId id="262" r:id="rId12"/>
+    <p:sldId id="263" r:id="rId13"/>
+    <p:sldId id="264" r:id="rId14"/>
+    <p:sldId id="265" r:id="rId15"/>
+    <p:sldId id="266" r:id="rId16"/>
+    <p:sldId id="267" r:id="rId17"/>
   </p:sldIdLst>
-  <p:sldSz cx="9144000" cy="6858000" type="screen4x3"/>
+  <p:sldSz cx="12192000" cy="6858000"/>
   <p:notesSz cx="6858000" cy="9144000"/>
   <p:defaultTextStyle>
     <a:defPPr>
       <a:defRPr lang="en-US"/>
     </a:defPPr>
-    <a:lvl1pPr algn="l" defTabSz="914400" eaLnBrk="1" hangingPunct="1" latinLnBrk="0" marL="0" rtl="0">
-      <a:defRPr kern="1200" sz="1800">
+    <a:lvl1pPr marL="0" algn="l" defTabSz="914400" rtl="0" eaLnBrk="1" latinLnBrk="0" hangingPunct="1">
+      <a:defRPr sz="1800" kern="1200">
         <a:solidFill>
           <a:schemeClr val="tx1"/>
         </a:solidFill>
@@ -29,8 +34,8 @@
         <a:cs typeface="+mn-cs"/>
       </a:defRPr>
     </a:lvl1pPr>
-    <a:lvl2pPr algn="l" defTabSz="914400" eaLnBrk="1" hangingPunct="1" latinLnBrk="0" marL="457200" rtl="0">
-      <a:defRPr kern="1200" sz="1800">
+    <a:lvl2pPr marL="457200" algn="l" defTabSz="914400" rtl="0" eaLnBrk="1" latinLnBrk="0" hangingPunct="1">
+      <a:defRPr sz="1800" kern="1200">
         <a:solidFill>
           <a:schemeClr val="tx1"/>
         </a:solidFill>
@@ -39,8 +44,8 @@
         <a:cs typeface="+mn-cs"/>
       </a:defRPr>
     </a:lvl2pPr>
-    <a:lvl3pPr algn="l" defTabSz="914400" eaLnBrk="1" hangingPunct="1" latinLnBrk="0" marL="914400" rtl="0">
-      <a:defRPr kern="1200" sz="1800">
+    <a:lvl3pPr marL="914400" algn="l" defTabSz="914400" rtl="0" eaLnBrk="1" latinLnBrk="0" hangingPunct="1">
+      <a:defRPr sz="1800" kern="1200">
         <a:solidFill>
           <a:schemeClr val="tx1"/>
         </a:solidFill>
@@ -49,8 +54,8 @@
         <a:cs typeface="+mn-cs"/>
       </a:defRPr>
     </a:lvl3pPr>
-    <a:lvl4pPr algn="l" defTabSz="914400" eaLnBrk="1" hangingPunct="1" latinLnBrk="0" marL="1371600" rtl="0">
-      <a:defRPr kern="1200" sz="1800">
+    <a:lvl4pPr marL="1371600" algn="l" defTabSz="914400" rtl="0" eaLnBrk="1" latinLnBrk="0" hangingPunct="1">
+      <a:defRPr sz="1800" kern="1200">
         <a:solidFill>
           <a:schemeClr val="tx1"/>
         </a:solidFill>
@@ -59,8 +64,8 @@
         <a:cs typeface="+mn-cs"/>
       </a:defRPr>
     </a:lvl4pPr>
-    <a:lvl5pPr algn="l" defTabSz="914400" eaLnBrk="1" hangingPunct="1" latinLnBrk="0" marL="1828800" rtl="0">
-      <a:defRPr kern="1200" sz="1800">
+    <a:lvl5pPr marL="1828800" algn="l" defTabSz="914400" rtl="0" eaLnBrk="1" latinLnBrk="0" hangingPunct="1">
+      <a:defRPr sz="1800" kern="1200">
         <a:solidFill>
           <a:schemeClr val="tx1"/>
         </a:solidFill>
@@ -69,8 +74,8 @@
         <a:cs typeface="+mn-cs"/>
       </a:defRPr>
     </a:lvl5pPr>
-    <a:lvl6pPr algn="l" defTabSz="914400" eaLnBrk="1" hangingPunct="1" latinLnBrk="0" marL="2286000" rtl="0">
-      <a:defRPr kern="1200" sz="1800">
+    <a:lvl6pPr marL="2286000" algn="l" defTabSz="914400" rtl="0" eaLnBrk="1" latinLnBrk="0" hangingPunct="1">
+      <a:defRPr sz="1800" kern="1200">
         <a:solidFill>
           <a:schemeClr val="tx1"/>
         </a:solidFill>
@@ -79,8 +84,8 @@
         <a:cs typeface="+mn-cs"/>
       </a:defRPr>
     </a:lvl6pPr>
-    <a:lvl7pPr algn="l" defTabSz="914400" eaLnBrk="1" hangingPunct="1" latinLnBrk="0" marL="2743200" rtl="0">
-      <a:defRPr kern="1200" sz="1800">
+    <a:lvl7pPr marL="2743200" algn="l" defTabSz="914400" rtl="0" eaLnBrk="1" latinLnBrk="0" hangingPunct="1">
+      <a:defRPr sz="1800" kern="1200">
         <a:solidFill>
           <a:schemeClr val="tx1"/>
         </a:solidFill>
@@ -89,8 +94,8 @@
         <a:cs typeface="+mn-cs"/>
       </a:defRPr>
     </a:lvl7pPr>
-    <a:lvl8pPr algn="l" defTabSz="914400" eaLnBrk="1" hangingPunct="1" latinLnBrk="0" marL="3200400" rtl="0">
-      <a:defRPr kern="1200" sz="1800">
+    <a:lvl8pPr marL="3200400" algn="l" defTabSz="914400" rtl="0" eaLnBrk="1" latinLnBrk="0" hangingPunct="1">
+      <a:defRPr sz="1800" kern="1200">
         <a:solidFill>
           <a:schemeClr val="tx1"/>
         </a:solidFill>
@@ -99,8 +104,8 @@
         <a:cs typeface="+mn-cs"/>
       </a:defRPr>
     </a:lvl8pPr>
-    <a:lvl9pPr algn="l" defTabSz="914400" eaLnBrk="1" hangingPunct="1" latinLnBrk="0" marL="3657600" rtl="0">
-      <a:defRPr kern="1200" sz="1800">
+    <a:lvl9pPr marL="3657600" algn="l" defTabSz="914400" rtl="0" eaLnBrk="1" latinLnBrk="0" hangingPunct="1">
+      <a:defRPr sz="1800" kern="1200">
         <a:solidFill>
           <a:schemeClr val="tx1"/>
         </a:solidFill>
@@ -110,27 +115,11 @@
       </a:defRPr>
     </a:lvl9pPr>
   </p:defaultTextStyle>
-  <p:extLst>
-    <p:ext uri="{EFAFB233-063F-42B5-8137-9DF3F51BA10A}">
-      <p15:sldGuideLst xmlns:p15="http://schemas.microsoft.com/office/powerpoint/2012/main">
-        <p15:guide id="1" orient="horz" pos="2160">
-          <p15:clr>
-            <a:srgbClr val="A4A3A4"/>
-          </p15:clr>
-        </p15:guide>
-        <p15:guide id="2" pos="2880">
-          <p15:clr>
-            <a:srgbClr val="A4A3A4"/>
-          </p15:clr>
-        </p15:guide>
-      </p15:sldGuideLst>
-    </p:ext>
-  </p:extLst>
 </p:presentation>
 </file>
 
 <file path=ppt/slideLayouts/slideLayout1.xml><?xml version="1.0" encoding="utf-8"?>
-<p:sldLayout xmlns:a="http://schemas.openxmlformats.org/drawingml/2006/main" xmlns:p="http://schemas.openxmlformats.org/presentationml/2006/main" xmlns:r="http://schemas.openxmlformats.org/officeDocument/2006/relationships" preserve="1" type="title">
+<p:sldLayout xmlns:a="http://schemas.openxmlformats.org/drawingml/2006/main" xmlns:r="http://schemas.openxmlformats.org/officeDocument/2006/relationships" xmlns:p="http://schemas.openxmlformats.org/presentationml/2006/main" type="title" preserve="1">
   <p:cSld name="Title Slide">
     <p:spTree>
       <p:nvGrpSpPr>
@@ -158,13 +147,17 @@
         </p:nvSpPr>
         <p:spPr>
           <a:xfrm>
-            <a:off x="685800" y="2130425"/>
-            <a:ext cx="7772400" cy="1470025"/>
+            <a:off x="1524000" y="1122363"/>
+            <a:ext cx="9144000" cy="2387600"/>
           </a:xfrm>
         </p:spPr>
         <p:txBody>
-          <a:bodyPr/>
-          <a:lstStyle/>
+          <a:bodyPr anchor="b"/>
+          <a:lstStyle>
+            <a:lvl1pPr algn="ctr">
+              <a:defRPr sz="6000"/>
+            </a:lvl1pPr>
+          </a:lstStyle>
           <a:p>
             <a:r>
               <a:rPr lang="en-US" smtClean="0"/>
@@ -181,107 +174,53 @@
             <a:spLocks noGrp="1"/>
           </p:cNvSpPr>
           <p:nvPr>
-            <p:ph idx="1" type="subTitle"/>
+            <p:ph type="subTitle" idx="1"/>
           </p:nvPr>
         </p:nvSpPr>
         <p:spPr>
           <a:xfrm>
-            <a:off x="1371600" y="3886200"/>
-            <a:ext cx="6400800" cy="1752600"/>
+            <a:off x="1524000" y="3602038"/>
+            <a:ext cx="9144000" cy="1655762"/>
           </a:xfrm>
         </p:spPr>
         <p:txBody>
           <a:bodyPr/>
           <a:lstStyle>
-            <a:lvl1pPr algn="ctr" indent="0" marL="0">
-              <a:buNone/>
-              <a:defRPr>
-                <a:solidFill>
-                  <a:schemeClr val="tx1">
-                    <a:tint val="75000"/>
-                  </a:schemeClr>
-                </a:solidFill>
-              </a:defRPr>
+            <a:lvl1pPr marL="0" indent="0" algn="ctr">
+              <a:buNone/>
+              <a:defRPr sz="2400"/>
             </a:lvl1pPr>
-            <a:lvl2pPr algn="ctr" indent="0" marL="457200">
-              <a:buNone/>
-              <a:defRPr>
-                <a:solidFill>
-                  <a:schemeClr val="tx1">
-                    <a:tint val="75000"/>
-                  </a:schemeClr>
-                </a:solidFill>
-              </a:defRPr>
+            <a:lvl2pPr marL="457200" indent="0" algn="ctr">
+              <a:buNone/>
+              <a:defRPr sz="2000"/>
             </a:lvl2pPr>
-            <a:lvl3pPr algn="ctr" indent="0" marL="914400">
-              <a:buNone/>
-              <a:defRPr>
-                <a:solidFill>
-                  <a:schemeClr val="tx1">
-                    <a:tint val="75000"/>
-                  </a:schemeClr>
-                </a:solidFill>
-              </a:defRPr>
+            <a:lvl3pPr marL="914400" indent="0" algn="ctr">
+              <a:buNone/>
+              <a:defRPr sz="1800"/>
             </a:lvl3pPr>
-            <a:lvl4pPr algn="ctr" indent="0" marL="1371600">
-              <a:buNone/>
-              <a:defRPr>
-                <a:solidFill>
-                  <a:schemeClr val="tx1">
-                    <a:tint val="75000"/>
-                  </a:schemeClr>
-                </a:solidFill>
-              </a:defRPr>
+            <a:lvl4pPr marL="1371600" indent="0" algn="ctr">
+              <a:buNone/>
+              <a:defRPr sz="1600"/>
             </a:lvl4pPr>
-            <a:lvl5pPr algn="ctr" indent="0" marL="1828800">
-              <a:buNone/>
-              <a:defRPr>
-                <a:solidFill>
-                  <a:schemeClr val="tx1">
-                    <a:tint val="75000"/>
-                  </a:schemeClr>
-                </a:solidFill>
-              </a:defRPr>
+            <a:lvl5pPr marL="1828800" indent="0" algn="ctr">
+              <a:buNone/>
+              <a:defRPr sz="1600"/>
             </a:lvl5pPr>
-            <a:lvl6pPr algn="ctr" indent="0" marL="2286000">
-              <a:buNone/>
-              <a:defRPr>
-                <a:solidFill>
-                  <a:schemeClr val="tx1">
-                    <a:tint val="75000"/>
-                  </a:schemeClr>
-                </a:solidFill>
-              </a:defRPr>
+            <a:lvl6pPr marL="2286000" indent="0" algn="ctr">
+              <a:buNone/>
+              <a:defRPr sz="1600"/>
             </a:lvl6pPr>
-            <a:lvl7pPr algn="ctr" indent="0" marL="2743200">
-              <a:buNone/>
-              <a:defRPr>
-                <a:solidFill>
-                  <a:schemeClr val="tx1">
-                    <a:tint val="75000"/>
-                  </a:schemeClr>
-                </a:solidFill>
-              </a:defRPr>
+            <a:lvl7pPr marL="2743200" indent="0" algn="ctr">
+              <a:buNone/>
+              <a:defRPr sz="1600"/>
             </a:lvl7pPr>
-            <a:lvl8pPr algn="ctr" indent="0" marL="3200400">
-              <a:buNone/>
-              <a:defRPr>
-                <a:solidFill>
-                  <a:schemeClr val="tx1">
-                    <a:tint val="75000"/>
-                  </a:schemeClr>
-                </a:solidFill>
-              </a:defRPr>
+            <a:lvl8pPr marL="3200400" indent="0" algn="ctr">
+              <a:buNone/>
+              <a:defRPr sz="1600"/>
             </a:lvl8pPr>
-            <a:lvl9pPr algn="ctr" indent="0" marL="3657600">
-              <a:buNone/>
-              <a:defRPr>
-                <a:solidFill>
-                  <a:schemeClr val="tx1">
-                    <a:tint val="75000"/>
-                  </a:schemeClr>
-                </a:solidFill>
-              </a:defRPr>
+            <a:lvl9pPr marL="3657600" indent="0" algn="ctr">
+              <a:buNone/>
+              <a:defRPr sz="1600"/>
             </a:lvl9pPr>
           </a:lstStyle>
           <a:p>
@@ -300,18 +239,17 @@
             <a:spLocks noGrp="1"/>
           </p:cNvSpPr>
           <p:nvPr>
-            <p:ph idx="10" sz="half" type="dt"/>
-          </p:nvPr>
-        </p:nvSpPr>
-        <p:spPr/>
-        <p:txBody>
-          <a:bodyPr/>
-          <a:lstStyle/>
-          <a:p>
-            <a:fld id="{1D8BD707-D9CF-40AE-B4C6-C98DA3205C09}" type="datetimeFigureOut">
-              <a:rPr lang="en-US" smtClean="0"/>
-              <a:pPr/>
-              <a:t>7/14/15</a:t>
+            <p:ph type="dt" sz="half" idx="10"/>
+          </p:nvPr>
+        </p:nvSpPr>
+        <p:spPr/>
+        <p:txBody>
+          <a:bodyPr/>
+          <a:lstStyle/>
+          <a:p>
+            <a:fld id="{261AD986-E844-8B40-950C-F4D283D6379F}" type="datetimeFigureOut">
+              <a:rPr lang="en-US" smtClean="0"/>
+              <a:t>11/9/15</a:t>
             </a:fld>
             <a:endParaRPr lang="en-US"/>
           </a:p>
@@ -324,7 +262,7 @@
             <a:spLocks noGrp="1"/>
           </p:cNvSpPr>
           <p:nvPr>
-            <p:ph idx="11" sz="quarter" type="ftr"/>
+            <p:ph type="ftr" sz="quarter" idx="11"/>
           </p:nvPr>
         </p:nvSpPr>
         <p:spPr/>
@@ -343,17 +281,16 @@
             <a:spLocks noGrp="1"/>
           </p:cNvSpPr>
           <p:nvPr>
-            <p:ph idx="12" sz="quarter" type="sldNum"/>
-          </p:nvPr>
-        </p:nvSpPr>
-        <p:spPr/>
-        <p:txBody>
-          <a:bodyPr/>
-          <a:lstStyle/>
-          <a:p>
-            <a:fld id="{B6F15528-21DE-4FAA-801E-634DDDAF4B2B}" type="slidenum">
-              <a:rPr lang="en-US" smtClean="0"/>
-              <a:pPr/>
+            <p:ph type="sldNum" sz="quarter" idx="12"/>
+          </p:nvPr>
+        </p:nvSpPr>
+        <p:spPr/>
+        <p:txBody>
+          <a:bodyPr/>
+          <a:lstStyle/>
+          <a:p>
+            <a:fld id="{A8731B33-9990-6748-A800-BE7B4ECD74C1}" type="slidenum">
+              <a:rPr lang="en-US" smtClean="0"/>
               <a:t>‹#›</a:t>
             </a:fld>
             <a:endParaRPr lang="en-US"/>
@@ -361,6 +298,11 @@
         </p:txBody>
       </p:sp>
     </p:spTree>
+    <p:extLst>
+      <p:ext uri="{BB962C8B-B14F-4D97-AF65-F5344CB8AC3E}">
+        <p14:creationId xmlns:p14="http://schemas.microsoft.com/office/powerpoint/2010/main" val="266020470"/>
+      </p:ext>
+    </p:extLst>
   </p:cSld>
   <p:clrMapOvr>
     <a:masterClrMapping/>
@@ -475,10 +417,9 @@
           <a:bodyPr/>
           <a:lstStyle/>
           <a:p>
-            <a:fld id="{1D8BD707-D9CF-40AE-B4C6-C98DA3205C09}" type="datetimeFigureOut">
-              <a:rPr lang="en-US" smtClean="0"/>
-              <a:pPr/>
-              <a:t>7/14/15</a:t>
+            <a:fld id="{261AD986-E844-8B40-950C-F4D283D6379F}" type="datetimeFigureOut">
+              <a:rPr lang="en-US" smtClean="0"/>
+              <a:t>11/9/15</a:t>
             </a:fld>
             <a:endParaRPr lang="en-US"/>
           </a:p>
@@ -518,9 +459,8 @@
           <a:bodyPr/>
           <a:lstStyle/>
           <a:p>
-            <a:fld id="{B6F15528-21DE-4FAA-801E-634DDDAF4B2B}" type="slidenum">
-              <a:rPr lang="en-US" smtClean="0"/>
-              <a:pPr/>
+            <a:fld id="{A8731B33-9990-6748-A800-BE7B4ECD74C1}" type="slidenum">
+              <a:rPr lang="en-US" smtClean="0"/>
               <a:t>‹#›</a:t>
             </a:fld>
             <a:endParaRPr lang="en-US"/>
@@ -528,6 +468,11 @@
         </p:txBody>
       </p:sp>
     </p:spTree>
+    <p:extLst>
+      <p:ext uri="{BB962C8B-B14F-4D97-AF65-F5344CB8AC3E}">
+        <p14:creationId xmlns:p14="http://schemas.microsoft.com/office/powerpoint/2010/main" val="908841161"/>
+      </p:ext>
+    </p:extLst>
   </p:cSld>
   <p:clrMapOvr>
     <a:masterClrMapping/>
@@ -564,8 +509,8 @@
         </p:nvSpPr>
         <p:spPr>
           <a:xfrm>
-            <a:off x="6629400" y="274638"/>
-            <a:ext cx="2057400" cy="5851525"/>
+            <a:off x="8724900" y="365125"/>
+            <a:ext cx="2628900" cy="5811838"/>
           </a:xfrm>
         </p:spPr>
         <p:txBody>
@@ -592,8 +537,8 @@
         </p:nvSpPr>
         <p:spPr>
           <a:xfrm>
-            <a:off x="457200" y="274638"/>
-            <a:ext cx="6019800" cy="5851525"/>
+            <a:off x="838200" y="365125"/>
+            <a:ext cx="7734300" cy="5811838"/>
           </a:xfrm>
         </p:spPr>
         <p:txBody>
@@ -652,10 +597,9 @@
           <a:bodyPr/>
           <a:lstStyle/>
           <a:p>
-            <a:fld id="{1D8BD707-D9CF-40AE-B4C6-C98DA3205C09}" type="datetimeFigureOut">
-              <a:rPr lang="en-US" smtClean="0"/>
-              <a:pPr/>
-              <a:t>7/14/15</a:t>
+            <a:fld id="{261AD986-E844-8B40-950C-F4D283D6379F}" type="datetimeFigureOut">
+              <a:rPr lang="en-US" smtClean="0"/>
+              <a:t>11/9/15</a:t>
             </a:fld>
             <a:endParaRPr lang="en-US"/>
           </a:p>
@@ -695,9 +639,8 @@
           <a:bodyPr/>
           <a:lstStyle/>
           <a:p>
-            <a:fld id="{B6F15528-21DE-4FAA-801E-634DDDAF4B2B}" type="slidenum">
-              <a:rPr lang="en-US" smtClean="0"/>
-              <a:pPr/>
+            <a:fld id="{A8731B33-9990-6748-A800-BE7B4ECD74C1}" type="slidenum">
+              <a:rPr lang="en-US" smtClean="0"/>
               <a:t>‹#›</a:t>
             </a:fld>
             <a:endParaRPr lang="en-US"/>
@@ -705,6 +648,316 @@
         </p:txBody>
       </p:sp>
     </p:spTree>
+    <p:extLst>
+      <p:ext uri="{BB962C8B-B14F-4D97-AF65-F5344CB8AC3E}">
+        <p14:creationId xmlns:p14="http://schemas.microsoft.com/office/powerpoint/2010/main" val="1989695463"/>
+      </p:ext>
+    </p:extLst>
+  </p:cSld>
+  <p:clrMapOvr>
+    <a:masterClrMapping/>
+  </p:clrMapOvr>
+</p:sldLayout>
+</file>
+
+<file path=ppt/slideLayouts/slideLayout12.xml><?xml version="1.0" encoding="utf-8"?>
+<p:sldLayout xmlns:a="http://schemas.openxmlformats.org/drawingml/2006/main" xmlns:r="http://schemas.openxmlformats.org/officeDocument/2006/relationships" xmlns:p="http://schemas.openxmlformats.org/presentationml/2006/main" preserve="1" userDrawn="1">
+  <p:cSld name="Clearstory Slide">
+    <p:spTree>
+      <p:nvGrpSpPr>
+        <p:cNvPr id="1" name=""/>
+        <p:cNvGrpSpPr/>
+        <p:nvPr/>
+      </p:nvGrpSpPr>
+      <p:grpSpPr>
+        <a:xfrm>
+          <a:off x="0" y="0"/>
+          <a:ext cx="0" cy="0"/>
+          <a:chOff x="0" y="0"/>
+          <a:chExt cx="0" cy="0"/>
+        </a:xfrm>
+      </p:grpSpPr>
+      <p:sp>
+        <p:nvSpPr>
+          <p:cNvPr id="2" name="Title 1"/>
+          <p:cNvSpPr>
+            <a:spLocks noGrp="1"/>
+          </p:cNvSpPr>
+          <p:nvPr>
+            <p:ph type="title"/>
+          </p:nvPr>
+        </p:nvSpPr>
+        <p:spPr>
+          <a:xfrm>
+            <a:off x="838200" y="365125"/>
+            <a:ext cx="10515600" cy="605719"/>
+          </a:xfrm>
+        </p:spPr>
+        <p:txBody>
+          <a:bodyPr/>
+          <a:lstStyle/>
+          <a:p>
+            <a:r>
+              <a:rPr lang="en-US" smtClean="0"/>
+              <a:t>Click to edit Master title style</a:t>
+            </a:r>
+            <a:endParaRPr lang="en-US"/>
+          </a:p>
+        </p:txBody>
+      </p:sp>
+      <p:sp>
+        <p:nvSpPr>
+          <p:cNvPr id="3" name="Date Placeholder 2"/>
+          <p:cNvSpPr>
+            <a:spLocks noGrp="1"/>
+          </p:cNvSpPr>
+          <p:nvPr>
+            <p:ph type="dt" sz="half" idx="10"/>
+          </p:nvPr>
+        </p:nvSpPr>
+        <p:spPr/>
+        <p:txBody>
+          <a:bodyPr/>
+          <a:lstStyle/>
+          <a:p>
+            <a:fld id="{261AD986-E844-8B40-950C-F4D283D6379F}" type="datetimeFigureOut">
+              <a:rPr lang="en-US" smtClean="0"/>
+              <a:t>11/11/15</a:t>
+            </a:fld>
+            <a:endParaRPr lang="en-US"/>
+          </a:p>
+        </p:txBody>
+      </p:sp>
+      <p:sp>
+        <p:nvSpPr>
+          <p:cNvPr id="4" name="Footer Placeholder 3"/>
+          <p:cNvSpPr>
+            <a:spLocks noGrp="1"/>
+          </p:cNvSpPr>
+          <p:nvPr>
+            <p:ph type="ftr" sz="quarter" idx="11"/>
+          </p:nvPr>
+        </p:nvSpPr>
+        <p:spPr/>
+        <p:txBody>
+          <a:bodyPr/>
+          <a:lstStyle/>
+          <a:p>
+            <a:endParaRPr lang="en-US"/>
+          </a:p>
+        </p:txBody>
+      </p:sp>
+      <p:sp>
+        <p:nvSpPr>
+          <p:cNvPr id="5" name="Slide Number Placeholder 4"/>
+          <p:cNvSpPr>
+            <a:spLocks noGrp="1"/>
+          </p:cNvSpPr>
+          <p:nvPr>
+            <p:ph type="sldNum" sz="quarter" idx="12"/>
+          </p:nvPr>
+        </p:nvSpPr>
+        <p:spPr/>
+        <p:txBody>
+          <a:bodyPr/>
+          <a:lstStyle/>
+          <a:p>
+            <a:fld id="{A8731B33-9990-6748-A800-BE7B4ECD74C1}" type="slidenum">
+              <a:rPr lang="en-US" smtClean="0"/>
+              <a:t>‹#›</a:t>
+            </a:fld>
+            <a:endParaRPr lang="en-US"/>
+          </a:p>
+        </p:txBody>
+      </p:sp>
+      <p:sp>
+        <p:nvSpPr>
+          <p:cNvPr id="7" name="Text Placeholder 6"/>
+          <p:cNvSpPr>
+            <a:spLocks noGrp="1"/>
+          </p:cNvSpPr>
+          <p:nvPr>
+            <p:ph type="body" sz="quarter" idx="13"/>
+          </p:nvPr>
+        </p:nvSpPr>
+        <p:spPr>
+          <a:xfrm>
+            <a:off x="838200" y="971550"/>
+            <a:ext cx="7772400" cy="914400"/>
+          </a:xfrm>
+        </p:spPr>
+        <p:txBody>
+          <a:bodyPr/>
+          <a:lstStyle/>
+          <a:p>
+            <a:pPr lvl="0"/>
+            <a:r>
+              <a:rPr lang="en-US" dirty="0" smtClean="0"/>
+              <a:t>Click to edit Master text styles</a:t>
+            </a:r>
+          </a:p>
+          <a:p>
+            <a:pPr lvl="1"/>
+            <a:r>
+              <a:rPr lang="en-US" dirty="0" smtClean="0"/>
+              <a:t>Second level</a:t>
+            </a:r>
+          </a:p>
+          <a:p>
+            <a:pPr lvl="2"/>
+            <a:r>
+              <a:rPr lang="en-US" dirty="0" smtClean="0"/>
+              <a:t>Third level</a:t>
+            </a:r>
+          </a:p>
+          <a:p>
+            <a:pPr lvl="3"/>
+            <a:r>
+              <a:rPr lang="en-US" dirty="0" smtClean="0"/>
+              <a:t>Fourth level</a:t>
+            </a:r>
+          </a:p>
+          <a:p>
+            <a:pPr lvl="4"/>
+            <a:r>
+              <a:rPr lang="en-US" dirty="0" smtClean="0"/>
+              <a:t>Fifth level</a:t>
+            </a:r>
+            <a:endParaRPr lang="en-US" dirty="0"/>
+          </a:p>
+        </p:txBody>
+      </p:sp>
+      <p:sp>
+        <p:nvSpPr>
+          <p:cNvPr id="9" name="Content Placeholder 8"/>
+          <p:cNvSpPr>
+            <a:spLocks noGrp="1"/>
+          </p:cNvSpPr>
+          <p:nvPr>
+            <p:ph sz="quarter" idx="14"/>
+          </p:nvPr>
+        </p:nvSpPr>
+        <p:spPr>
+          <a:xfrm>
+            <a:off x="838200" y="1885950"/>
+            <a:ext cx="7772400" cy="4311650"/>
+          </a:xfrm>
+        </p:spPr>
+        <p:txBody>
+          <a:bodyPr/>
+          <a:lstStyle/>
+          <a:p>
+            <a:pPr lvl="3"/>
+            <a:r>
+              <a:rPr lang="en-US" smtClean="0"/>
+              <a:t>Fourth level</a:t>
+            </a:r>
+          </a:p>
+          <a:p>
+            <a:pPr lvl="4"/>
+            <a:r>
+              <a:rPr lang="en-US" smtClean="0"/>
+              <a:t>Fifth level</a:t>
+            </a:r>
+            <a:endParaRPr lang="en-US"/>
+          </a:p>
+        </p:txBody>
+      </p:sp>
+      <p:sp>
+        <p:nvSpPr>
+          <p:cNvPr id="11" name="Content Placeholder 10"/>
+          <p:cNvSpPr>
+            <a:spLocks noGrp="1"/>
+          </p:cNvSpPr>
+          <p:nvPr>
+            <p:ph sz="quarter" idx="15"/>
+          </p:nvPr>
+        </p:nvSpPr>
+        <p:spPr>
+          <a:xfrm>
+            <a:off x="8610600" y="1885950"/>
+            <a:ext cx="2743200" cy="4311650"/>
+          </a:xfrm>
+        </p:spPr>
+        <p:txBody>
+          <a:bodyPr/>
+          <a:lstStyle/>
+          <a:p>
+            <a:pPr lvl="0"/>
+            <a:r>
+              <a:rPr lang="en-US" smtClean="0"/>
+              <a:t>Click to edit Master text styles</a:t>
+            </a:r>
+          </a:p>
+          <a:p>
+            <a:pPr lvl="1"/>
+            <a:r>
+              <a:rPr lang="en-US" dirty="0" smtClean="0"/>
+              <a:t>Second level</a:t>
+            </a:r>
+          </a:p>
+          <a:p>
+            <a:pPr lvl="2"/>
+            <a:r>
+              <a:rPr lang="en-US" dirty="0" smtClean="0"/>
+              <a:t>Third level</a:t>
+            </a:r>
+          </a:p>
+          <a:p>
+            <a:pPr lvl="3"/>
+            <a:r>
+              <a:rPr lang="en-US" dirty="0" smtClean="0"/>
+              <a:t>Fourth level</a:t>
+            </a:r>
+          </a:p>
+          <a:p>
+            <a:pPr lvl="4"/>
+            <a:r>
+              <a:rPr lang="en-US" dirty="0" smtClean="0"/>
+              <a:t>Fifth level</a:t>
+            </a:r>
+            <a:endParaRPr lang="en-US" dirty="0"/>
+          </a:p>
+        </p:txBody>
+      </p:sp>
+      <p:sp>
+        <p:nvSpPr>
+          <p:cNvPr id="8" name="Text Placeholder 7"/>
+          <p:cNvSpPr>
+            <a:spLocks noGrp="1"/>
+          </p:cNvSpPr>
+          <p:nvPr>
+            <p:ph type="body" sz="quarter" idx="16"/>
+          </p:nvPr>
+        </p:nvSpPr>
+        <p:spPr>
+          <a:xfrm>
+            <a:off x="8610600" y="971550"/>
+            <a:ext cx="2743200" cy="914400"/>
+          </a:xfrm>
+        </p:spPr>
+        <p:txBody>
+          <a:bodyPr>
+            <a:normAutofit/>
+          </a:bodyPr>
+          <a:lstStyle>
+            <a:lvl1pPr marL="0" indent="0">
+              <a:buNone/>
+              <a:defRPr sz="1200"/>
+            </a:lvl1pPr>
+          </a:lstStyle>
+          <a:p>
+            <a:pPr lvl="0"/>
+            <a:endParaRPr lang="en-US" dirty="0"/>
+          </a:p>
+        </p:txBody>
+      </p:sp>
+    </p:spTree>
+    <p:extLst>
+      <p:ext uri="{BB962C8B-B14F-4D97-AF65-F5344CB8AC3E}">
+        <p14:creationId xmlns:p14="http://schemas.microsoft.com/office/powerpoint/2010/main" val="244892505"/>
+      </p:ext>
+    </p:extLst>
   </p:cSld>
   <p:clrMapOvr>
     <a:masterClrMapping/>
@@ -713,7 +966,7 @@
 </file>
 
 <file path=ppt/slideLayouts/slideLayout2.xml><?xml version="1.0" encoding="utf-8"?>
-<p:sldLayout xmlns:a="http://schemas.openxmlformats.org/drawingml/2006/main" xmlns:p="http://schemas.openxmlformats.org/presentationml/2006/main" xmlns:r="http://schemas.openxmlformats.org/officeDocument/2006/relationships" preserve="1" type="obj">
+<p:sldLayout xmlns:a="http://schemas.openxmlformats.org/drawingml/2006/main" xmlns:r="http://schemas.openxmlformats.org/officeDocument/2006/relationships" xmlns:p="http://schemas.openxmlformats.org/presentationml/2006/main" type="obj" preserve="1">
   <p:cSld name="Title and Content">
     <p:spTree>
       <p:nvGrpSpPr>
@@ -811,18 +1064,17 @@
             <a:spLocks noGrp="1"/>
           </p:cNvSpPr>
           <p:nvPr>
-            <p:ph idx="10" sz="half" type="dt"/>
-          </p:nvPr>
-        </p:nvSpPr>
-        <p:spPr/>
-        <p:txBody>
-          <a:bodyPr/>
-          <a:lstStyle/>
-          <a:p>
-            <a:fld id="{1D8BD707-D9CF-40AE-B4C6-C98DA3205C09}" type="datetimeFigureOut">
-              <a:rPr lang="en-US" smtClean="0"/>
-              <a:pPr/>
-              <a:t>7/14/15</a:t>
+            <p:ph type="dt" sz="half" idx="10"/>
+          </p:nvPr>
+        </p:nvSpPr>
+        <p:spPr/>
+        <p:txBody>
+          <a:bodyPr/>
+          <a:lstStyle/>
+          <a:p>
+            <a:fld id="{261AD986-E844-8B40-950C-F4D283D6379F}" type="datetimeFigureOut">
+              <a:rPr lang="en-US" smtClean="0"/>
+              <a:t>11/9/15</a:t>
             </a:fld>
             <a:endParaRPr lang="en-US"/>
           </a:p>
@@ -835,7 +1087,7 @@
             <a:spLocks noGrp="1"/>
           </p:cNvSpPr>
           <p:nvPr>
-            <p:ph idx="11" sz="quarter" type="ftr"/>
+            <p:ph type="ftr" sz="quarter" idx="11"/>
           </p:nvPr>
         </p:nvSpPr>
         <p:spPr/>
@@ -854,17 +1106,16 @@
             <a:spLocks noGrp="1"/>
           </p:cNvSpPr>
           <p:nvPr>
-            <p:ph idx="12" sz="quarter" type="sldNum"/>
-          </p:nvPr>
-        </p:nvSpPr>
-        <p:spPr/>
-        <p:txBody>
-          <a:bodyPr/>
-          <a:lstStyle/>
-          <a:p>
-            <a:fld id="{B6F15528-21DE-4FAA-801E-634DDDAF4B2B}" type="slidenum">
-              <a:rPr lang="en-US" smtClean="0"/>
-              <a:pPr/>
+            <p:ph type="sldNum" sz="quarter" idx="12"/>
+          </p:nvPr>
+        </p:nvSpPr>
+        <p:spPr/>
+        <p:txBody>
+          <a:bodyPr/>
+          <a:lstStyle/>
+          <a:p>
+            <a:fld id="{A8731B33-9990-6748-A800-BE7B4ECD74C1}" type="slidenum">
+              <a:rPr lang="en-US" smtClean="0"/>
               <a:t>‹#›</a:t>
             </a:fld>
             <a:endParaRPr lang="en-US"/>
@@ -872,6 +1123,11 @@
         </p:txBody>
       </p:sp>
     </p:spTree>
+    <p:extLst>
+      <p:ext uri="{BB962C8B-B14F-4D97-AF65-F5344CB8AC3E}">
+        <p14:creationId xmlns:p14="http://schemas.microsoft.com/office/powerpoint/2010/main" val="1416991279"/>
+      </p:ext>
+    </p:extLst>
   </p:cSld>
   <p:clrMapOvr>
     <a:masterClrMapping/>
@@ -908,15 +1164,15 @@
         </p:nvSpPr>
         <p:spPr>
           <a:xfrm>
-            <a:off x="722313" y="4406900"/>
-            <a:ext cx="7772400" cy="1362075"/>
+            <a:off x="831850" y="1709738"/>
+            <a:ext cx="10515600" cy="2852737"/>
           </a:xfrm>
         </p:spPr>
         <p:txBody>
-          <a:bodyPr anchor="t"/>
+          <a:bodyPr anchor="b"/>
           <a:lstStyle>
-            <a:lvl1pPr algn="l">
-              <a:defRPr sz="4000" b="1" cap="all"/>
+            <a:lvl1pPr>
+              <a:defRPr sz="6000"/>
             </a:lvl1pPr>
           </a:lstStyle>
           <a:p>
@@ -940,16 +1196,16 @@
         </p:nvSpPr>
         <p:spPr>
           <a:xfrm>
-            <a:off x="722313" y="2906713"/>
-            <a:ext cx="7772400" cy="1500187"/>
+            <a:off x="831850" y="4589463"/>
+            <a:ext cx="10515600" cy="1500187"/>
           </a:xfrm>
         </p:spPr>
         <p:txBody>
-          <a:bodyPr anchor="b"/>
+          <a:bodyPr/>
           <a:lstStyle>
             <a:lvl1pPr marL="0" indent="0">
               <a:buNone/>
-              <a:defRPr sz="2000">
+              <a:defRPr sz="2400">
                 <a:solidFill>
                   <a:schemeClr val="tx1">
                     <a:tint val="75000"/>
@@ -959,7 +1215,7 @@
             </a:lvl1pPr>
             <a:lvl2pPr marL="457200" indent="0">
               <a:buNone/>
-              <a:defRPr sz="1800">
+              <a:defRPr sz="2000">
                 <a:solidFill>
                   <a:schemeClr val="tx1">
                     <a:tint val="75000"/>
@@ -969,7 +1225,7 @@
             </a:lvl2pPr>
             <a:lvl3pPr marL="914400" indent="0">
               <a:buNone/>
-              <a:defRPr sz="1600">
+              <a:defRPr sz="1800">
                 <a:solidFill>
                   <a:schemeClr val="tx1">
                     <a:tint val="75000"/>
@@ -979,7 +1235,7 @@
             </a:lvl3pPr>
             <a:lvl4pPr marL="1371600" indent="0">
               <a:buNone/>
-              <a:defRPr sz="1400">
+              <a:defRPr sz="1600">
                 <a:solidFill>
                   <a:schemeClr val="tx1">
                     <a:tint val="75000"/>
@@ -989,7 +1245,7 @@
             </a:lvl4pPr>
             <a:lvl5pPr marL="1828800" indent="0">
               <a:buNone/>
-              <a:defRPr sz="1400">
+              <a:defRPr sz="1600">
                 <a:solidFill>
                   <a:schemeClr val="tx1">
                     <a:tint val="75000"/>
@@ -999,7 +1255,7 @@
             </a:lvl5pPr>
             <a:lvl6pPr marL="2286000" indent="0">
               <a:buNone/>
-              <a:defRPr sz="1400">
+              <a:defRPr sz="1600">
                 <a:solidFill>
                   <a:schemeClr val="tx1">
                     <a:tint val="75000"/>
@@ -1009,7 +1265,7 @@
             </a:lvl6pPr>
             <a:lvl7pPr marL="2743200" indent="0">
               <a:buNone/>
-              <a:defRPr sz="1400">
+              <a:defRPr sz="1600">
                 <a:solidFill>
                   <a:schemeClr val="tx1">
                     <a:tint val="75000"/>
@@ -1019,7 +1275,7 @@
             </a:lvl7pPr>
             <a:lvl8pPr marL="3200400" indent="0">
               <a:buNone/>
-              <a:defRPr sz="1400">
+              <a:defRPr sz="1600">
                 <a:solidFill>
                   <a:schemeClr val="tx1">
                     <a:tint val="75000"/>
@@ -1029,7 +1285,7 @@
             </a:lvl8pPr>
             <a:lvl9pPr marL="3657600" indent="0">
               <a:buNone/>
-              <a:defRPr sz="1400">
+              <a:defRPr sz="1600">
                 <a:solidFill>
                   <a:schemeClr val="tx1">
                     <a:tint val="75000"/>
@@ -1062,10 +1318,9 @@
           <a:bodyPr/>
           <a:lstStyle/>
           <a:p>
-            <a:fld id="{1D8BD707-D9CF-40AE-B4C6-C98DA3205C09}" type="datetimeFigureOut">
-              <a:rPr lang="en-US" smtClean="0"/>
-              <a:pPr/>
-              <a:t>7/14/15</a:t>
+            <a:fld id="{261AD986-E844-8B40-950C-F4D283D6379F}" type="datetimeFigureOut">
+              <a:rPr lang="en-US" smtClean="0"/>
+              <a:t>11/9/15</a:t>
             </a:fld>
             <a:endParaRPr lang="en-US"/>
           </a:p>
@@ -1105,9 +1360,8 @@
           <a:bodyPr/>
           <a:lstStyle/>
           <a:p>
-            <a:fld id="{B6F15528-21DE-4FAA-801E-634DDDAF4B2B}" type="slidenum">
-              <a:rPr lang="en-US" smtClean="0"/>
-              <a:pPr/>
+            <a:fld id="{A8731B33-9990-6748-A800-BE7B4ECD74C1}" type="slidenum">
+              <a:rPr lang="en-US" smtClean="0"/>
               <a:t>‹#›</a:t>
             </a:fld>
             <a:endParaRPr lang="en-US"/>
@@ -1115,6 +1369,11 @@
         </p:txBody>
       </p:sp>
     </p:spTree>
+    <p:extLst>
+      <p:ext uri="{BB962C8B-B14F-4D97-AF65-F5344CB8AC3E}">
+        <p14:creationId xmlns:p14="http://schemas.microsoft.com/office/powerpoint/2010/main" val="1926264570"/>
+      </p:ext>
+    </p:extLst>
   </p:cSld>
   <p:clrMapOvr>
     <a:masterClrMapping/>
@@ -1174,41 +1433,13 @@
         </p:nvSpPr>
         <p:spPr>
           <a:xfrm>
-            <a:off x="457200" y="1600200"/>
-            <a:ext cx="4038600" cy="4525963"/>
+            <a:off x="838200" y="1825625"/>
+            <a:ext cx="5181600" cy="4351338"/>
           </a:xfrm>
         </p:spPr>
         <p:txBody>
           <a:bodyPr/>
-          <a:lstStyle>
-            <a:lvl1pPr>
-              <a:defRPr sz="2800"/>
-            </a:lvl1pPr>
-            <a:lvl2pPr>
-              <a:defRPr sz="2400"/>
-            </a:lvl2pPr>
-            <a:lvl3pPr>
-              <a:defRPr sz="2000"/>
-            </a:lvl3pPr>
-            <a:lvl4pPr>
-              <a:defRPr sz="1800"/>
-            </a:lvl4pPr>
-            <a:lvl5pPr>
-              <a:defRPr sz="1800"/>
-            </a:lvl5pPr>
-            <a:lvl6pPr>
-              <a:defRPr sz="1800"/>
-            </a:lvl6pPr>
-            <a:lvl7pPr>
-              <a:defRPr sz="1800"/>
-            </a:lvl7pPr>
-            <a:lvl8pPr>
-              <a:defRPr sz="1800"/>
-            </a:lvl8pPr>
-            <a:lvl9pPr>
-              <a:defRPr sz="1800"/>
-            </a:lvl9pPr>
-          </a:lstStyle>
+          <a:lstStyle/>
           <a:p>
             <a:pPr lvl="0"/>
             <a:r>
@@ -1259,41 +1490,13 @@
         </p:nvSpPr>
         <p:spPr>
           <a:xfrm>
-            <a:off x="4648200" y="1600200"/>
-            <a:ext cx="4038600" cy="4525963"/>
+            <a:off x="6172200" y="1825625"/>
+            <a:ext cx="5181600" cy="4351338"/>
           </a:xfrm>
         </p:spPr>
         <p:txBody>
           <a:bodyPr/>
-          <a:lstStyle>
-            <a:lvl1pPr>
-              <a:defRPr sz="2800"/>
-            </a:lvl1pPr>
-            <a:lvl2pPr>
-              <a:defRPr sz="2400"/>
-            </a:lvl2pPr>
-            <a:lvl3pPr>
-              <a:defRPr sz="2000"/>
-            </a:lvl3pPr>
-            <a:lvl4pPr>
-              <a:defRPr sz="1800"/>
-            </a:lvl4pPr>
-            <a:lvl5pPr>
-              <a:defRPr sz="1800"/>
-            </a:lvl5pPr>
-            <a:lvl6pPr>
-              <a:defRPr sz="1800"/>
-            </a:lvl6pPr>
-            <a:lvl7pPr>
-              <a:defRPr sz="1800"/>
-            </a:lvl7pPr>
-            <a:lvl8pPr>
-              <a:defRPr sz="1800"/>
-            </a:lvl8pPr>
-            <a:lvl9pPr>
-              <a:defRPr sz="1800"/>
-            </a:lvl9pPr>
-          </a:lstStyle>
+          <a:lstStyle/>
           <a:p>
             <a:pPr lvl="0"/>
             <a:r>
@@ -1347,10 +1550,9 @@
           <a:bodyPr/>
           <a:lstStyle/>
           <a:p>
-            <a:fld id="{1D8BD707-D9CF-40AE-B4C6-C98DA3205C09}" type="datetimeFigureOut">
-              <a:rPr lang="en-US" smtClean="0"/>
-              <a:pPr/>
-              <a:t>7/14/15</a:t>
+            <a:fld id="{261AD986-E844-8B40-950C-F4D283D6379F}" type="datetimeFigureOut">
+              <a:rPr lang="en-US" smtClean="0"/>
+              <a:t>11/9/15</a:t>
             </a:fld>
             <a:endParaRPr lang="en-US"/>
           </a:p>
@@ -1390,9 +1592,8 @@
           <a:bodyPr/>
           <a:lstStyle/>
           <a:p>
-            <a:fld id="{B6F15528-21DE-4FAA-801E-634DDDAF4B2B}" type="slidenum">
-              <a:rPr lang="en-US" smtClean="0"/>
-              <a:pPr/>
+            <a:fld id="{A8731B33-9990-6748-A800-BE7B4ECD74C1}" type="slidenum">
+              <a:rPr lang="en-US" smtClean="0"/>
               <a:t>‹#›</a:t>
             </a:fld>
             <a:endParaRPr lang="en-US"/>
@@ -1400,6 +1601,11 @@
         </p:txBody>
       </p:sp>
     </p:spTree>
+    <p:extLst>
+      <p:ext uri="{BB962C8B-B14F-4D97-AF65-F5344CB8AC3E}">
+        <p14:creationId xmlns:p14="http://schemas.microsoft.com/office/powerpoint/2010/main" val="1412649465"/>
+      </p:ext>
+    </p:extLst>
   </p:cSld>
   <p:clrMapOvr>
     <a:masterClrMapping/>
@@ -1434,37 +1640,38 @@
             <p:ph type="title"/>
           </p:nvPr>
         </p:nvSpPr>
-        <p:spPr/>
-        <p:txBody>
-          <a:bodyPr/>
-          <a:lstStyle>
-            <a:lvl1pPr>
-              <a:defRPr/>
-            </a:lvl1pPr>
-          </a:lstStyle>
-          <a:p>
-            <a:r>
-              <a:rPr lang="en-US" smtClean="0"/>
-              <a:t>Click to edit Master title style</a:t>
-            </a:r>
-            <a:endParaRPr lang="en-US"/>
-          </a:p>
-        </p:txBody>
-      </p:sp>
-      <p:sp>
-        <p:nvSpPr>
-          <p:cNvPr id="3" name="Text Placeholder 2"/>
-          <p:cNvSpPr>
-            <a:spLocks noGrp="1"/>
-          </p:cNvSpPr>
-          <p:nvPr>
-            <p:ph type="body" idx="1"/>
-          </p:nvPr>
-        </p:nvSpPr>
         <p:spPr>
           <a:xfrm>
-            <a:off x="457200" y="1535113"/>
-            <a:ext cx="4040188" cy="639762"/>
+            <a:off x="839788" y="365125"/>
+            <a:ext cx="10515600" cy="1325563"/>
+          </a:xfrm>
+        </p:spPr>
+        <p:txBody>
+          <a:bodyPr/>
+          <a:lstStyle/>
+          <a:p>
+            <a:r>
+              <a:rPr lang="en-US" smtClean="0"/>
+              <a:t>Click to edit Master title style</a:t>
+            </a:r>
+            <a:endParaRPr lang="en-US"/>
+          </a:p>
+        </p:txBody>
+      </p:sp>
+      <p:sp>
+        <p:nvSpPr>
+          <p:cNvPr id="3" name="Text Placeholder 2"/>
+          <p:cNvSpPr>
+            <a:spLocks noGrp="1"/>
+          </p:cNvSpPr>
+          <p:nvPr>
+            <p:ph type="body" idx="1"/>
+          </p:nvPr>
+        </p:nvSpPr>
+        <p:spPr>
+          <a:xfrm>
+            <a:off x="839788" y="1681163"/>
+            <a:ext cx="5157787" cy="823912"/>
           </a:xfrm>
         </p:spPr>
         <p:txBody>
@@ -1528,41 +1735,13 @@
         </p:nvSpPr>
         <p:spPr>
           <a:xfrm>
-            <a:off x="457200" y="2174875"/>
-            <a:ext cx="4040188" cy="3951288"/>
+            <a:off x="839788" y="2505075"/>
+            <a:ext cx="5157787" cy="3684588"/>
           </a:xfrm>
         </p:spPr>
         <p:txBody>
           <a:bodyPr/>
-          <a:lstStyle>
-            <a:lvl1pPr>
-              <a:defRPr sz="2400"/>
-            </a:lvl1pPr>
-            <a:lvl2pPr>
-              <a:defRPr sz="2000"/>
-            </a:lvl2pPr>
-            <a:lvl3pPr>
-              <a:defRPr sz="1800"/>
-            </a:lvl3pPr>
-            <a:lvl4pPr>
-              <a:defRPr sz="1600"/>
-            </a:lvl4pPr>
-            <a:lvl5pPr>
-              <a:defRPr sz="1600"/>
-            </a:lvl5pPr>
-            <a:lvl6pPr>
-              <a:defRPr sz="1600"/>
-            </a:lvl6pPr>
-            <a:lvl7pPr>
-              <a:defRPr sz="1600"/>
-            </a:lvl7pPr>
-            <a:lvl8pPr>
-              <a:defRPr sz="1600"/>
-            </a:lvl8pPr>
-            <a:lvl9pPr>
-              <a:defRPr sz="1600"/>
-            </a:lvl9pPr>
-          </a:lstStyle>
+          <a:lstStyle/>
           <a:p>
             <a:pPr lvl="0"/>
             <a:r>
@@ -1613,8 +1792,8 @@
         </p:nvSpPr>
         <p:spPr>
           <a:xfrm>
-            <a:off x="4645025" y="1535113"/>
-            <a:ext cx="4041775" cy="639762"/>
+            <a:off x="6172200" y="1681163"/>
+            <a:ext cx="5183188" cy="823912"/>
           </a:xfrm>
         </p:spPr>
         <p:txBody>
@@ -1678,41 +1857,13 @@
         </p:nvSpPr>
         <p:spPr>
           <a:xfrm>
-            <a:off x="4645025" y="2174875"/>
-            <a:ext cx="4041775" cy="3951288"/>
+            <a:off x="6172200" y="2505075"/>
+            <a:ext cx="5183188" cy="3684588"/>
           </a:xfrm>
         </p:spPr>
         <p:txBody>
           <a:bodyPr/>
-          <a:lstStyle>
-            <a:lvl1pPr>
-              <a:defRPr sz="2400"/>
-            </a:lvl1pPr>
-            <a:lvl2pPr>
-              <a:defRPr sz="2000"/>
-            </a:lvl2pPr>
-            <a:lvl3pPr>
-              <a:defRPr sz="1800"/>
-            </a:lvl3pPr>
-            <a:lvl4pPr>
-              <a:defRPr sz="1600"/>
-            </a:lvl4pPr>
-            <a:lvl5pPr>
-              <a:defRPr sz="1600"/>
-            </a:lvl5pPr>
-            <a:lvl6pPr>
-              <a:defRPr sz="1600"/>
-            </a:lvl6pPr>
-            <a:lvl7pPr>
-              <a:defRPr sz="1600"/>
-            </a:lvl7pPr>
-            <a:lvl8pPr>
-              <a:defRPr sz="1600"/>
-            </a:lvl8pPr>
-            <a:lvl9pPr>
-              <a:defRPr sz="1600"/>
-            </a:lvl9pPr>
-          </a:lstStyle>
+          <a:lstStyle/>
           <a:p>
             <a:pPr lvl="0"/>
             <a:r>
@@ -1766,10 +1917,9 @@
           <a:bodyPr/>
           <a:lstStyle/>
           <a:p>
-            <a:fld id="{1D8BD707-D9CF-40AE-B4C6-C98DA3205C09}" type="datetimeFigureOut">
-              <a:rPr lang="en-US" smtClean="0"/>
-              <a:pPr/>
-              <a:t>7/14/15</a:t>
+            <a:fld id="{261AD986-E844-8B40-950C-F4D283D6379F}" type="datetimeFigureOut">
+              <a:rPr lang="en-US" smtClean="0"/>
+              <a:t>11/9/15</a:t>
             </a:fld>
             <a:endParaRPr lang="en-US"/>
           </a:p>
@@ -1809,9 +1959,8 @@
           <a:bodyPr/>
           <a:lstStyle/>
           <a:p>
-            <a:fld id="{B6F15528-21DE-4FAA-801E-634DDDAF4B2B}" type="slidenum">
-              <a:rPr lang="en-US" smtClean="0"/>
-              <a:pPr/>
+            <a:fld id="{A8731B33-9990-6748-A800-BE7B4ECD74C1}" type="slidenum">
+              <a:rPr lang="en-US" smtClean="0"/>
               <a:t>‹#›</a:t>
             </a:fld>
             <a:endParaRPr lang="en-US"/>
@@ -1819,6 +1968,11 @@
         </p:txBody>
       </p:sp>
     </p:spTree>
+    <p:extLst>
+      <p:ext uri="{BB962C8B-B14F-4D97-AF65-F5344CB8AC3E}">
+        <p14:creationId xmlns:p14="http://schemas.microsoft.com/office/powerpoint/2010/main" val="1967840670"/>
+      </p:ext>
+    </p:extLst>
   </p:cSld>
   <p:clrMapOvr>
     <a:masterClrMapping/>
@@ -1881,10 +2035,9 @@
           <a:bodyPr/>
           <a:lstStyle/>
           <a:p>
-            <a:fld id="{1D8BD707-D9CF-40AE-B4C6-C98DA3205C09}" type="datetimeFigureOut">
-              <a:rPr lang="en-US" smtClean="0"/>
-              <a:pPr/>
-              <a:t>7/14/15</a:t>
+            <a:fld id="{261AD986-E844-8B40-950C-F4D283D6379F}" type="datetimeFigureOut">
+              <a:rPr lang="en-US" smtClean="0"/>
+              <a:t>11/9/15</a:t>
             </a:fld>
             <a:endParaRPr lang="en-US"/>
           </a:p>
@@ -1924,9 +2077,8 @@
           <a:bodyPr/>
           <a:lstStyle/>
           <a:p>
-            <a:fld id="{B6F15528-21DE-4FAA-801E-634DDDAF4B2B}" type="slidenum">
-              <a:rPr lang="en-US" smtClean="0"/>
-              <a:pPr/>
+            <a:fld id="{A8731B33-9990-6748-A800-BE7B4ECD74C1}" type="slidenum">
+              <a:rPr lang="en-US" smtClean="0"/>
               <a:t>‹#›</a:t>
             </a:fld>
             <a:endParaRPr lang="en-US"/>
@@ -1934,6 +2086,11 @@
         </p:txBody>
       </p:sp>
     </p:spTree>
+    <p:extLst>
+      <p:ext uri="{BB962C8B-B14F-4D97-AF65-F5344CB8AC3E}">
+        <p14:creationId xmlns:p14="http://schemas.microsoft.com/office/powerpoint/2010/main" val="102493243"/>
+      </p:ext>
+    </p:extLst>
   </p:cSld>
   <p:clrMapOvr>
     <a:masterClrMapping/>
@@ -1973,10 +2130,9 @@
           <a:bodyPr/>
           <a:lstStyle/>
           <a:p>
-            <a:fld id="{1D8BD707-D9CF-40AE-B4C6-C98DA3205C09}" type="datetimeFigureOut">
-              <a:rPr lang="en-US" smtClean="0"/>
-              <a:pPr/>
-              <a:t>7/14/15</a:t>
+            <a:fld id="{261AD986-E844-8B40-950C-F4D283D6379F}" type="datetimeFigureOut">
+              <a:rPr lang="en-US" smtClean="0"/>
+              <a:t>11/9/15</a:t>
             </a:fld>
             <a:endParaRPr lang="en-US"/>
           </a:p>
@@ -2016,9 +2172,8 @@
           <a:bodyPr/>
           <a:lstStyle/>
           <a:p>
-            <a:fld id="{B6F15528-21DE-4FAA-801E-634DDDAF4B2B}" type="slidenum">
-              <a:rPr lang="en-US" smtClean="0"/>
-              <a:pPr/>
+            <a:fld id="{A8731B33-9990-6748-A800-BE7B4ECD74C1}" type="slidenum">
+              <a:rPr lang="en-US" smtClean="0"/>
               <a:t>‹#›</a:t>
             </a:fld>
             <a:endParaRPr lang="en-US"/>
@@ -2026,6 +2181,11 @@
         </p:txBody>
       </p:sp>
     </p:spTree>
+    <p:extLst>
+      <p:ext uri="{BB962C8B-B14F-4D97-AF65-F5344CB8AC3E}">
+        <p14:creationId xmlns:p14="http://schemas.microsoft.com/office/powerpoint/2010/main" val="322050207"/>
+      </p:ext>
+    </p:extLst>
   </p:cSld>
   <p:clrMapOvr>
     <a:masterClrMapping/>
@@ -2062,15 +2222,15 @@
         </p:nvSpPr>
         <p:spPr>
           <a:xfrm>
-            <a:off x="457200" y="273050"/>
-            <a:ext cx="3008313" cy="1162050"/>
+            <a:off x="839788" y="457200"/>
+            <a:ext cx="3932237" cy="1600200"/>
           </a:xfrm>
         </p:spPr>
         <p:txBody>
           <a:bodyPr anchor="b"/>
           <a:lstStyle>
-            <a:lvl1pPr algn="l">
-              <a:defRPr sz="2000" b="1"/>
+            <a:lvl1pPr>
+              <a:defRPr sz="3200"/>
             </a:lvl1pPr>
           </a:lstStyle>
           <a:p>
@@ -2094,8 +2254,8 @@
         </p:nvSpPr>
         <p:spPr>
           <a:xfrm>
-            <a:off x="3575050" y="273050"/>
-            <a:ext cx="5111750" cy="5853113"/>
+            <a:off x="5183188" y="987425"/>
+            <a:ext cx="6172200" cy="4873625"/>
           </a:xfrm>
         </p:spPr>
         <p:txBody>
@@ -2179,8 +2339,8 @@
         </p:nvSpPr>
         <p:spPr>
           <a:xfrm>
-            <a:off x="457200" y="1435100"/>
-            <a:ext cx="3008313" cy="4691063"/>
+            <a:off x="839788" y="2057400"/>
+            <a:ext cx="3932237" cy="3811588"/>
           </a:xfrm>
         </p:spPr>
         <p:txBody>
@@ -2188,39 +2348,39 @@
           <a:lstStyle>
             <a:lvl1pPr marL="0" indent="0">
               <a:buNone/>
-              <a:defRPr sz="1400"/>
+              <a:defRPr sz="1600"/>
             </a:lvl1pPr>
             <a:lvl2pPr marL="457200" indent="0">
               <a:buNone/>
-              <a:defRPr sz="1200"/>
+              <a:defRPr sz="1400"/>
             </a:lvl2pPr>
             <a:lvl3pPr marL="914400" indent="0">
               <a:buNone/>
-              <a:defRPr sz="1000"/>
+              <a:defRPr sz="1200"/>
             </a:lvl3pPr>
             <a:lvl4pPr marL="1371600" indent="0">
               <a:buNone/>
-              <a:defRPr sz="900"/>
+              <a:defRPr sz="1000"/>
             </a:lvl4pPr>
             <a:lvl5pPr marL="1828800" indent="0">
               <a:buNone/>
-              <a:defRPr sz="900"/>
+              <a:defRPr sz="1000"/>
             </a:lvl5pPr>
             <a:lvl6pPr marL="2286000" indent="0">
               <a:buNone/>
-              <a:defRPr sz="900"/>
+              <a:defRPr sz="1000"/>
             </a:lvl6pPr>
             <a:lvl7pPr marL="2743200" indent="0">
               <a:buNone/>
-              <a:defRPr sz="900"/>
+              <a:defRPr sz="1000"/>
             </a:lvl7pPr>
             <a:lvl8pPr marL="3200400" indent="0">
               <a:buNone/>
-              <a:defRPr sz="900"/>
+              <a:defRPr sz="1000"/>
             </a:lvl8pPr>
             <a:lvl9pPr marL="3657600" indent="0">
               <a:buNone/>
-              <a:defRPr sz="900"/>
+              <a:defRPr sz="1000"/>
             </a:lvl9pPr>
           </a:lstStyle>
           <a:p>
@@ -2247,10 +2407,9 @@
           <a:bodyPr/>
           <a:lstStyle/>
           <a:p>
-            <a:fld id="{1D8BD707-D9CF-40AE-B4C6-C98DA3205C09}" type="datetimeFigureOut">
-              <a:rPr lang="en-US" smtClean="0"/>
-              <a:pPr/>
-              <a:t>7/14/15</a:t>
+            <a:fld id="{261AD986-E844-8B40-950C-F4D283D6379F}" type="datetimeFigureOut">
+              <a:rPr lang="en-US" smtClean="0"/>
+              <a:t>11/9/15</a:t>
             </a:fld>
             <a:endParaRPr lang="en-US"/>
           </a:p>
@@ -2290,9 +2449,8 @@
           <a:bodyPr/>
           <a:lstStyle/>
           <a:p>
-            <a:fld id="{B6F15528-21DE-4FAA-801E-634DDDAF4B2B}" type="slidenum">
-              <a:rPr lang="en-US" smtClean="0"/>
-              <a:pPr/>
+            <a:fld id="{A8731B33-9990-6748-A800-BE7B4ECD74C1}" type="slidenum">
+              <a:rPr lang="en-US" smtClean="0"/>
               <a:t>‹#›</a:t>
             </a:fld>
             <a:endParaRPr lang="en-US"/>
@@ -2300,6 +2458,11 @@
         </p:txBody>
       </p:sp>
     </p:spTree>
+    <p:extLst>
+      <p:ext uri="{BB962C8B-B14F-4D97-AF65-F5344CB8AC3E}">
+        <p14:creationId xmlns:p14="http://schemas.microsoft.com/office/powerpoint/2010/main" val="1039038609"/>
+      </p:ext>
+    </p:extLst>
   </p:cSld>
   <p:clrMapOvr>
     <a:masterClrMapping/>
@@ -2336,15 +2499,15 @@
         </p:nvSpPr>
         <p:spPr>
           <a:xfrm>
-            <a:off x="1792288" y="4800600"/>
-            <a:ext cx="5486400" cy="566738"/>
+            <a:off x="839788" y="457200"/>
+            <a:ext cx="3932237" cy="1600200"/>
           </a:xfrm>
         </p:spPr>
         <p:txBody>
           <a:bodyPr anchor="b"/>
           <a:lstStyle>
-            <a:lvl1pPr algn="l">
-              <a:defRPr sz="2000" b="1"/>
+            <a:lvl1pPr>
+              <a:defRPr sz="3200"/>
             </a:lvl1pPr>
           </a:lstStyle>
           <a:p>
@@ -2368,8 +2531,8 @@
         </p:nvSpPr>
         <p:spPr>
           <a:xfrm>
-            <a:off x="1792288" y="612775"/>
-            <a:ext cx="5486400" cy="4114800"/>
+            <a:off x="5183188" y="987425"/>
+            <a:ext cx="6172200" cy="4873625"/>
           </a:xfrm>
         </p:spPr>
         <p:txBody>
@@ -2429,8 +2592,8 @@
         </p:nvSpPr>
         <p:spPr>
           <a:xfrm>
-            <a:off x="1792288" y="5367338"/>
-            <a:ext cx="5486400" cy="804862"/>
+            <a:off x="839788" y="2057400"/>
+            <a:ext cx="3932237" cy="3811588"/>
           </a:xfrm>
         </p:spPr>
         <p:txBody>
@@ -2438,39 +2601,39 @@
           <a:lstStyle>
             <a:lvl1pPr marL="0" indent="0">
               <a:buNone/>
-              <a:defRPr sz="1400"/>
+              <a:defRPr sz="1600"/>
             </a:lvl1pPr>
             <a:lvl2pPr marL="457200" indent="0">
               <a:buNone/>
-              <a:defRPr sz="1200"/>
+              <a:defRPr sz="1400"/>
             </a:lvl2pPr>
             <a:lvl3pPr marL="914400" indent="0">
               <a:buNone/>
-              <a:defRPr sz="1000"/>
+              <a:defRPr sz="1200"/>
             </a:lvl3pPr>
             <a:lvl4pPr marL="1371600" indent="0">
               <a:buNone/>
-              <a:defRPr sz="900"/>
+              <a:defRPr sz="1000"/>
             </a:lvl4pPr>
             <a:lvl5pPr marL="1828800" indent="0">
               <a:buNone/>
-              <a:defRPr sz="900"/>
+              <a:defRPr sz="1000"/>
             </a:lvl5pPr>
             <a:lvl6pPr marL="2286000" indent="0">
               <a:buNone/>
-              <a:defRPr sz="900"/>
+              <a:defRPr sz="1000"/>
             </a:lvl6pPr>
             <a:lvl7pPr marL="2743200" indent="0">
               <a:buNone/>
-              <a:defRPr sz="900"/>
+              <a:defRPr sz="1000"/>
             </a:lvl7pPr>
             <a:lvl8pPr marL="3200400" indent="0">
               <a:buNone/>
-              <a:defRPr sz="900"/>
+              <a:defRPr sz="1000"/>
             </a:lvl8pPr>
             <a:lvl9pPr marL="3657600" indent="0">
               <a:buNone/>
-              <a:defRPr sz="900"/>
+              <a:defRPr sz="1000"/>
             </a:lvl9pPr>
           </a:lstStyle>
           <a:p>
@@ -2497,10 +2660,9 @@
           <a:bodyPr/>
           <a:lstStyle/>
           <a:p>
-            <a:fld id="{1D8BD707-D9CF-40AE-B4C6-C98DA3205C09}" type="datetimeFigureOut">
-              <a:rPr lang="en-US" smtClean="0"/>
-              <a:pPr/>
-              <a:t>7/14/15</a:t>
+            <a:fld id="{261AD986-E844-8B40-950C-F4D283D6379F}" type="datetimeFigureOut">
+              <a:rPr lang="en-US" smtClean="0"/>
+              <a:t>11/9/15</a:t>
             </a:fld>
             <a:endParaRPr lang="en-US"/>
           </a:p>
@@ -2540,9 +2702,8 @@
           <a:bodyPr/>
           <a:lstStyle/>
           <a:p>
-            <a:fld id="{B6F15528-21DE-4FAA-801E-634DDDAF4B2B}" type="slidenum">
-              <a:rPr lang="en-US" smtClean="0"/>
-              <a:pPr/>
+            <a:fld id="{A8731B33-9990-6748-A800-BE7B4ECD74C1}" type="slidenum">
+              <a:rPr lang="en-US" smtClean="0"/>
               <a:t>‹#›</a:t>
             </a:fld>
             <a:endParaRPr lang="en-US"/>
@@ -2550,6 +2711,11 @@
         </p:txBody>
       </p:sp>
     </p:spTree>
+    <p:extLst>
+      <p:ext uri="{BB962C8B-B14F-4D97-AF65-F5344CB8AC3E}">
+        <p14:creationId xmlns:p14="http://schemas.microsoft.com/office/powerpoint/2010/main" val="1932367706"/>
+      </p:ext>
+    </p:extLst>
   </p:cSld>
   <p:clrMapOvr>
     <a:masterClrMapping/>
@@ -2558,7 +2724,7 @@
 </file>
 
 <file path=ppt/slideMasters/slideMaster1.xml><?xml version="1.0" encoding="utf-8"?>
-<p:sldMaster xmlns:a="http://schemas.openxmlformats.org/drawingml/2006/main" xmlns:p="http://schemas.openxmlformats.org/presentationml/2006/main" xmlns:r="http://schemas.openxmlformats.org/officeDocument/2006/relationships">
+<p:sldMaster xmlns:a="http://schemas.openxmlformats.org/drawingml/2006/main" xmlns:r="http://schemas.openxmlformats.org/officeDocument/2006/relationships" xmlns:p="http://schemas.openxmlformats.org/presentationml/2006/main">
   <p:cSld>
     <p:bg>
       <p:bgRef idx="1001">
@@ -2591,15 +2757,15 @@
         </p:nvSpPr>
         <p:spPr>
           <a:xfrm>
-            <a:off x="457200" y="274638"/>
-            <a:ext cx="8229600" cy="1143000"/>
+            <a:off x="838200" y="365125"/>
+            <a:ext cx="10515600" cy="1325563"/>
           </a:xfrm>
           <a:prstGeom prst="rect">
             <a:avLst/>
           </a:prstGeom>
         </p:spPr>
         <p:txBody>
-          <a:bodyPr anchor="ctr" bIns="45720" lIns="91440" rIns="91440" rtlCol="0" tIns="45720" vert="horz">
+          <a:bodyPr vert="horz" lIns="91440" tIns="45720" rIns="91440" bIns="45720" rtlCol="0" anchor="ctr">
             <a:normAutofit/>
           </a:bodyPr>
           <a:lstStyle/>
@@ -2619,20 +2785,20 @@
             <a:spLocks noGrp="1"/>
           </p:cNvSpPr>
           <p:nvPr>
-            <p:ph idx="1" type="body"/>
+            <p:ph type="body" idx="1"/>
           </p:nvPr>
         </p:nvSpPr>
         <p:spPr>
           <a:xfrm>
-            <a:off x="457200" y="1600200"/>
-            <a:ext cx="8229600" cy="4525963"/>
+            <a:off x="838200" y="1825625"/>
+            <a:ext cx="10515600" cy="4351338"/>
           </a:xfrm>
           <a:prstGeom prst="rect">
             <a:avLst/>
           </a:prstGeom>
         </p:spPr>
         <p:txBody>
-          <a:bodyPr bIns="45720" lIns="91440" rIns="91440" rtlCol="0" tIns="45720" vert="horz">
+          <a:bodyPr vert="horz" lIns="91440" tIns="45720" rIns="91440" bIns="45720" rtlCol="0">
             <a:normAutofit/>
           </a:bodyPr>
           <a:lstStyle/>
@@ -2681,20 +2847,20 @@
             <a:spLocks noGrp="1"/>
           </p:cNvSpPr>
           <p:nvPr>
-            <p:ph idx="2" sz="half" type="dt"/>
+            <p:ph type="dt" sz="half" idx="2"/>
           </p:nvPr>
         </p:nvSpPr>
         <p:spPr>
           <a:xfrm>
-            <a:off x="457200" y="6356350"/>
-            <a:ext cx="2133600" cy="365125"/>
+            <a:off x="838200" y="6356350"/>
+            <a:ext cx="2743200" cy="365125"/>
           </a:xfrm>
           <a:prstGeom prst="rect">
             <a:avLst/>
           </a:prstGeom>
         </p:spPr>
         <p:txBody>
-          <a:bodyPr anchor="ctr" bIns="45720" lIns="91440" rIns="91440" rtlCol="0" tIns="45720" vert="horz"/>
+          <a:bodyPr vert="horz" lIns="91440" tIns="45720" rIns="91440" bIns="45720" rtlCol="0" anchor="ctr"/>
           <a:lstStyle>
             <a:lvl1pPr algn="l">
               <a:defRPr sz="1200">
@@ -2707,10 +2873,9 @@
             </a:lvl1pPr>
           </a:lstStyle>
           <a:p>
-            <a:fld id="{1D8BD707-D9CF-40AE-B4C6-C98DA3205C09}" type="datetimeFigureOut">
-              <a:rPr lang="en-US" smtClean="0"/>
-              <a:pPr/>
-              <a:t>7/14/15</a:t>
+            <a:fld id="{261AD986-E844-8B40-950C-F4D283D6379F}" type="datetimeFigureOut">
+              <a:rPr lang="en-US" smtClean="0"/>
+              <a:t>11/9/15</a:t>
             </a:fld>
             <a:endParaRPr lang="en-US"/>
           </a:p>
@@ -2723,20 +2888,20 @@
             <a:spLocks noGrp="1"/>
           </p:cNvSpPr>
           <p:nvPr>
-            <p:ph idx="3" sz="quarter" type="ftr"/>
+            <p:ph type="ftr" sz="quarter" idx="3"/>
           </p:nvPr>
         </p:nvSpPr>
         <p:spPr>
           <a:xfrm>
-            <a:off x="3124200" y="6356350"/>
-            <a:ext cx="2895600" cy="365125"/>
+            <a:off x="4038600" y="6356350"/>
+            <a:ext cx="4114800" cy="365125"/>
           </a:xfrm>
           <a:prstGeom prst="rect">
             <a:avLst/>
           </a:prstGeom>
         </p:spPr>
         <p:txBody>
-          <a:bodyPr anchor="ctr" bIns="45720" lIns="91440" rIns="91440" rtlCol="0" tIns="45720" vert="horz"/>
+          <a:bodyPr vert="horz" lIns="91440" tIns="45720" rIns="91440" bIns="45720" rtlCol="0" anchor="ctr"/>
           <a:lstStyle>
             <a:lvl1pPr algn="ctr">
               <a:defRPr sz="1200">
@@ -2760,20 +2925,20 @@
             <a:spLocks noGrp="1"/>
           </p:cNvSpPr>
           <p:nvPr>
-            <p:ph idx="4" sz="quarter" type="sldNum"/>
+            <p:ph type="sldNum" sz="quarter" idx="4"/>
           </p:nvPr>
         </p:nvSpPr>
         <p:spPr>
           <a:xfrm>
-            <a:off x="6553200" y="6356350"/>
-            <a:ext cx="2133600" cy="365125"/>
+            <a:off x="8610600" y="6356350"/>
+            <a:ext cx="2743200" cy="365125"/>
           </a:xfrm>
           <a:prstGeom prst="rect">
             <a:avLst/>
           </a:prstGeom>
         </p:spPr>
         <p:txBody>
-          <a:bodyPr anchor="ctr" bIns="45720" lIns="91440" rIns="91440" rtlCol="0" tIns="45720" vert="horz"/>
+          <a:bodyPr vert="horz" lIns="91440" tIns="45720" rIns="91440" bIns="45720" rtlCol="0" anchor="ctr"/>
           <a:lstStyle>
             <a:lvl1pPr algn="r">
               <a:defRPr sz="1200">
@@ -2786,9 +2951,8 @@
             </a:lvl1pPr>
           </a:lstStyle>
           <a:p>
-            <a:fld id="{B6F15528-21DE-4FAA-801E-634DDDAF4B2B}" type="slidenum">
-              <a:rPr lang="en-US" smtClean="0"/>
-              <a:pPr/>
+            <a:fld id="{A8731B33-9990-6748-A800-BE7B4ECD74C1}" type="slidenum">
+              <a:rPr lang="en-US" smtClean="0"/>
               <a:t>‹#›</a:t>
             </a:fld>
             <a:endParaRPr lang="en-US"/>
@@ -2796,8 +2960,13 @@
         </p:txBody>
       </p:sp>
     </p:spTree>
+    <p:extLst>
+      <p:ext uri="{BB962C8B-B14F-4D97-AF65-F5344CB8AC3E}">
+        <p14:creationId xmlns:p14="http://schemas.microsoft.com/office/powerpoint/2010/main" val="228729800"/>
+      </p:ext>
+    </p:extLst>
   </p:cSld>
-  <p:clrMap accent1="accent1" accent2="accent2" accent3="accent3" accent4="accent4" accent5="accent5" accent6="accent6" bg1="lt1" bg2="lt2" folHlink="folHlink" hlink="hlink" tx1="dk1" tx2="dk2"/>
+  <p:clrMap bg1="lt1" tx1="dk1" bg2="lt2" tx2="dk2" accent1="accent1" accent2="accent2" accent3="accent3" accent4="accent4" accent5="accent5" accent6="accent6" hlink="hlink" folHlink="folHlink"/>
   <p:sldLayoutIdLst>
     <p:sldLayoutId id="2147483649" r:id="rId1"/>
     <p:sldLayoutId id="2147483650" r:id="rId2"/>
@@ -2810,15 +2979,19 @@
     <p:sldLayoutId id="2147483657" r:id="rId9"/>
     <p:sldLayoutId id="2147483658" r:id="rId10"/>
     <p:sldLayoutId id="2147483659" r:id="rId11"/>
+    <p:sldLayoutId id="2147483660" r:id="rId12"/>
   </p:sldLayoutIdLst>
   <p:txStyles>
     <p:titleStyle>
-      <a:lvl1pPr algn="ctr" defTabSz="914400" eaLnBrk="1" hangingPunct="1" latinLnBrk="0" rtl="0">
+      <a:lvl1pPr algn="l" defTabSz="914400" rtl="0" eaLnBrk="1" latinLnBrk="0" hangingPunct="1">
+        <a:lnSpc>
+          <a:spcPct val="90000"/>
+        </a:lnSpc>
         <a:spcBef>
           <a:spcPct val="0"/>
         </a:spcBef>
         <a:buNone/>
-        <a:defRPr kern="1200" sz="4400">
+        <a:defRPr sz="4400" kern="1200">
           <a:solidFill>
             <a:schemeClr val="tx1"/>
           </a:solidFill>
@@ -2829,13 +3002,16 @@
       </a:lvl1pPr>
     </p:titleStyle>
     <p:bodyStyle>
-      <a:lvl1pPr algn="l" defTabSz="914400" eaLnBrk="1" hangingPunct="1" indent="-342900" latinLnBrk="0" marL="342900" rtl="0">
+      <a:lvl1pPr marL="228600" indent="-228600" algn="l" defTabSz="914400" rtl="0" eaLnBrk="1" latinLnBrk="0" hangingPunct="1">
+        <a:lnSpc>
+          <a:spcPct val="90000"/>
+        </a:lnSpc>
         <a:spcBef>
-          <a:spcPct val="20000"/>
+          <a:spcPts val="1000"/>
         </a:spcBef>
-        <a:buFont charset="0" pitchFamily="34" typeface="Arial"/>
+        <a:buFont typeface="Arial"/>
         <a:buChar char="•"/>
-        <a:defRPr kern="1200" sz="3200">
+        <a:defRPr sz="2800" kern="1200">
           <a:solidFill>
             <a:schemeClr val="tx1"/>
           </a:solidFill>
@@ -2844,13 +3020,16 @@
           <a:cs typeface="+mn-cs"/>
         </a:defRPr>
       </a:lvl1pPr>
-      <a:lvl2pPr algn="l" defTabSz="914400" eaLnBrk="1" hangingPunct="1" indent="-285750" latinLnBrk="0" marL="742950" rtl="0">
+      <a:lvl2pPr marL="685800" indent="-228600" algn="l" defTabSz="914400" rtl="0" eaLnBrk="1" latinLnBrk="0" hangingPunct="1">
+        <a:lnSpc>
+          <a:spcPct val="90000"/>
+        </a:lnSpc>
         <a:spcBef>
-          <a:spcPct val="20000"/>
+          <a:spcPts val="500"/>
         </a:spcBef>
-        <a:buFont charset="0" pitchFamily="34" typeface="Arial"/>
-        <a:buChar char="–"/>
-        <a:defRPr kern="1200" sz="2800">
+        <a:buFont typeface="Arial"/>
+        <a:buChar char="•"/>
+        <a:defRPr sz="2400" kern="1200">
           <a:solidFill>
             <a:schemeClr val="tx1"/>
           </a:solidFill>
@@ -2859,13 +3038,16 @@
           <a:cs typeface="+mn-cs"/>
         </a:defRPr>
       </a:lvl2pPr>
-      <a:lvl3pPr algn="l" defTabSz="914400" eaLnBrk="1" hangingPunct="1" indent="-228600" latinLnBrk="0" marL="1143000" rtl="0">
+      <a:lvl3pPr marL="1143000" indent="-228600" algn="l" defTabSz="914400" rtl="0" eaLnBrk="1" latinLnBrk="0" hangingPunct="1">
+        <a:lnSpc>
+          <a:spcPct val="90000"/>
+        </a:lnSpc>
         <a:spcBef>
-          <a:spcPct val="20000"/>
+          <a:spcPts val="500"/>
         </a:spcBef>
-        <a:buFont charset="0" pitchFamily="34" typeface="Arial"/>
+        <a:buFont typeface="Arial"/>
         <a:buChar char="•"/>
-        <a:defRPr kern="1200" sz="2400">
+        <a:defRPr sz="2000" kern="1200">
           <a:solidFill>
             <a:schemeClr val="tx1"/>
           </a:solidFill>
@@ -2874,13 +3056,16 @@
           <a:cs typeface="+mn-cs"/>
         </a:defRPr>
       </a:lvl3pPr>
-      <a:lvl4pPr algn="l" defTabSz="914400" eaLnBrk="1" hangingPunct="1" indent="-228600" latinLnBrk="0" marL="1600200" rtl="0">
+      <a:lvl4pPr marL="1600200" indent="-228600" algn="l" defTabSz="914400" rtl="0" eaLnBrk="1" latinLnBrk="0" hangingPunct="1">
+        <a:lnSpc>
+          <a:spcPct val="90000"/>
+        </a:lnSpc>
         <a:spcBef>
-          <a:spcPct val="20000"/>
+          <a:spcPts val="500"/>
         </a:spcBef>
-        <a:buFont charset="0" pitchFamily="34" typeface="Arial"/>
-        <a:buChar char="–"/>
-        <a:defRPr kern="1200" sz="2000">
+        <a:buFont typeface="Arial"/>
+        <a:buChar char="•"/>
+        <a:defRPr sz="1800" kern="1200">
           <a:solidFill>
             <a:schemeClr val="tx1"/>
           </a:solidFill>
@@ -2889,13 +3074,16 @@
           <a:cs typeface="+mn-cs"/>
         </a:defRPr>
       </a:lvl4pPr>
-      <a:lvl5pPr algn="l" defTabSz="914400" eaLnBrk="1" hangingPunct="1" indent="-228600" latinLnBrk="0" marL="2057400" rtl="0">
+      <a:lvl5pPr marL="2057400" indent="-228600" algn="l" defTabSz="914400" rtl="0" eaLnBrk="1" latinLnBrk="0" hangingPunct="1">
+        <a:lnSpc>
+          <a:spcPct val="90000"/>
+        </a:lnSpc>
         <a:spcBef>
-          <a:spcPct val="20000"/>
+          <a:spcPts val="500"/>
         </a:spcBef>
-        <a:buFont charset="0" pitchFamily="34" typeface="Arial"/>
-        <a:buChar char="»"/>
-        <a:defRPr kern="1200" sz="2000">
+        <a:buFont typeface="Arial"/>
+        <a:buChar char="•"/>
+        <a:defRPr sz="1800" kern="1200">
           <a:solidFill>
             <a:schemeClr val="tx1"/>
           </a:solidFill>
@@ -2904,13 +3092,16 @@
           <a:cs typeface="+mn-cs"/>
         </a:defRPr>
       </a:lvl5pPr>
-      <a:lvl6pPr algn="l" defTabSz="914400" eaLnBrk="1" hangingPunct="1" indent="-228600" latinLnBrk="0" marL="2514600" rtl="0">
+      <a:lvl6pPr marL="2514600" indent="-228600" algn="l" defTabSz="914400" rtl="0" eaLnBrk="1" latinLnBrk="0" hangingPunct="1">
+        <a:lnSpc>
+          <a:spcPct val="90000"/>
+        </a:lnSpc>
         <a:spcBef>
-          <a:spcPct val="20000"/>
+          <a:spcPts val="500"/>
         </a:spcBef>
-        <a:buFont charset="0" pitchFamily="34" typeface="Arial"/>
+        <a:buFont typeface="Arial"/>
         <a:buChar char="•"/>
-        <a:defRPr kern="1200" sz="2000">
+        <a:defRPr sz="1800" kern="1200">
           <a:solidFill>
             <a:schemeClr val="tx1"/>
           </a:solidFill>
@@ -2919,13 +3110,16 @@
           <a:cs typeface="+mn-cs"/>
         </a:defRPr>
       </a:lvl6pPr>
-      <a:lvl7pPr algn="l" defTabSz="914400" eaLnBrk="1" hangingPunct="1" indent="-228600" latinLnBrk="0" marL="2971800" rtl="0">
+      <a:lvl7pPr marL="2971800" indent="-228600" algn="l" defTabSz="914400" rtl="0" eaLnBrk="1" latinLnBrk="0" hangingPunct="1">
+        <a:lnSpc>
+          <a:spcPct val="90000"/>
+        </a:lnSpc>
         <a:spcBef>
-          <a:spcPct val="20000"/>
+          <a:spcPts val="500"/>
         </a:spcBef>
-        <a:buFont charset="0" pitchFamily="34" typeface="Arial"/>
+        <a:buFont typeface="Arial"/>
         <a:buChar char="•"/>
-        <a:defRPr kern="1200" sz="2000">
+        <a:defRPr sz="1800" kern="1200">
           <a:solidFill>
             <a:schemeClr val="tx1"/>
           </a:solidFill>
@@ -2934,13 +3128,16 @@
           <a:cs typeface="+mn-cs"/>
         </a:defRPr>
       </a:lvl7pPr>
-      <a:lvl8pPr algn="l" defTabSz="914400" eaLnBrk="1" hangingPunct="1" indent="-228600" latinLnBrk="0" marL="3429000" rtl="0">
+      <a:lvl8pPr marL="3429000" indent="-228600" algn="l" defTabSz="914400" rtl="0" eaLnBrk="1" latinLnBrk="0" hangingPunct="1">
+        <a:lnSpc>
+          <a:spcPct val="90000"/>
+        </a:lnSpc>
         <a:spcBef>
-          <a:spcPct val="20000"/>
+          <a:spcPts val="500"/>
         </a:spcBef>
-        <a:buFont charset="0" pitchFamily="34" typeface="Arial"/>
+        <a:buFont typeface="Arial"/>
         <a:buChar char="•"/>
-        <a:defRPr kern="1200" sz="2000">
+        <a:defRPr sz="1800" kern="1200">
           <a:solidFill>
             <a:schemeClr val="tx1"/>
           </a:solidFill>
@@ -2949,13 +3146,16 @@
           <a:cs typeface="+mn-cs"/>
         </a:defRPr>
       </a:lvl8pPr>
-      <a:lvl9pPr algn="l" defTabSz="914400" eaLnBrk="1" hangingPunct="1" indent="-228600" latinLnBrk="0" marL="3886200" rtl="0">
+      <a:lvl9pPr marL="3886200" indent="-228600" algn="l" defTabSz="914400" rtl="0" eaLnBrk="1" latinLnBrk="0" hangingPunct="1">
+        <a:lnSpc>
+          <a:spcPct val="90000"/>
+        </a:lnSpc>
         <a:spcBef>
-          <a:spcPct val="20000"/>
+          <a:spcPts val="500"/>
         </a:spcBef>
-        <a:buFont charset="0" pitchFamily="34" typeface="Arial"/>
+        <a:buFont typeface="Arial"/>
         <a:buChar char="•"/>
-        <a:defRPr kern="1200" sz="2000">
+        <a:defRPr sz="1800" kern="1200">
           <a:solidFill>
             <a:schemeClr val="tx1"/>
           </a:solidFill>
@@ -2969,8 +3169,8 @@
       <a:defPPr>
         <a:defRPr lang="en-US"/>
       </a:defPPr>
-      <a:lvl1pPr algn="l" defTabSz="914400" eaLnBrk="1" hangingPunct="1" latinLnBrk="0" marL="0" rtl="0">
-        <a:defRPr kern="1200" sz="1800">
+      <a:lvl1pPr marL="0" algn="l" defTabSz="914400" rtl="0" eaLnBrk="1" latinLnBrk="0" hangingPunct="1">
+        <a:defRPr sz="1800" kern="1200">
           <a:solidFill>
             <a:schemeClr val="tx1"/>
           </a:solidFill>
@@ -2979,8 +3179,8 @@
           <a:cs typeface="+mn-cs"/>
         </a:defRPr>
       </a:lvl1pPr>
-      <a:lvl2pPr algn="l" defTabSz="914400" eaLnBrk="1" hangingPunct="1" latinLnBrk="0" marL="457200" rtl="0">
-        <a:defRPr kern="1200" sz="1800">
+      <a:lvl2pPr marL="457200" algn="l" defTabSz="914400" rtl="0" eaLnBrk="1" latinLnBrk="0" hangingPunct="1">
+        <a:defRPr sz="1800" kern="1200">
           <a:solidFill>
             <a:schemeClr val="tx1"/>
           </a:solidFill>
@@ -2989,8 +3189,8 @@
           <a:cs typeface="+mn-cs"/>
         </a:defRPr>
       </a:lvl2pPr>
-      <a:lvl3pPr algn="l" defTabSz="914400" eaLnBrk="1" hangingPunct="1" latinLnBrk="0" marL="914400" rtl="0">
-        <a:defRPr kern="1200" sz="1800">
+      <a:lvl3pPr marL="914400" algn="l" defTabSz="914400" rtl="0" eaLnBrk="1" latinLnBrk="0" hangingPunct="1">
+        <a:defRPr sz="1800" kern="1200">
           <a:solidFill>
             <a:schemeClr val="tx1"/>
           </a:solidFill>
@@ -2999,8 +3199,8 @@
           <a:cs typeface="+mn-cs"/>
         </a:defRPr>
       </a:lvl3pPr>
-      <a:lvl4pPr algn="l" defTabSz="914400" eaLnBrk="1" hangingPunct="1" latinLnBrk="0" marL="1371600" rtl="0">
-        <a:defRPr kern="1200" sz="1800">
+      <a:lvl4pPr marL="1371600" algn="l" defTabSz="914400" rtl="0" eaLnBrk="1" latinLnBrk="0" hangingPunct="1">
+        <a:defRPr sz="1800" kern="1200">
           <a:solidFill>
             <a:schemeClr val="tx1"/>
           </a:solidFill>
@@ -3009,8 +3209,8 @@
           <a:cs typeface="+mn-cs"/>
         </a:defRPr>
       </a:lvl4pPr>
-      <a:lvl5pPr algn="l" defTabSz="914400" eaLnBrk="1" hangingPunct="1" latinLnBrk="0" marL="1828800" rtl="0">
-        <a:defRPr kern="1200" sz="1800">
+      <a:lvl5pPr marL="1828800" algn="l" defTabSz="914400" rtl="0" eaLnBrk="1" latinLnBrk="0" hangingPunct="1">
+        <a:defRPr sz="1800" kern="1200">
           <a:solidFill>
             <a:schemeClr val="tx1"/>
           </a:solidFill>
@@ -3019,8 +3219,8 @@
           <a:cs typeface="+mn-cs"/>
         </a:defRPr>
       </a:lvl5pPr>
-      <a:lvl6pPr algn="l" defTabSz="914400" eaLnBrk="1" hangingPunct="1" latinLnBrk="0" marL="2286000" rtl="0">
-        <a:defRPr kern="1200" sz="1800">
+      <a:lvl6pPr marL="2286000" algn="l" defTabSz="914400" rtl="0" eaLnBrk="1" latinLnBrk="0" hangingPunct="1">
+        <a:defRPr sz="1800" kern="1200">
           <a:solidFill>
             <a:schemeClr val="tx1"/>
           </a:solidFill>
@@ -3029,8 +3229,8 @@
           <a:cs typeface="+mn-cs"/>
         </a:defRPr>
       </a:lvl6pPr>
-      <a:lvl7pPr algn="l" defTabSz="914400" eaLnBrk="1" hangingPunct="1" latinLnBrk="0" marL="2743200" rtl="0">
-        <a:defRPr kern="1200" sz="1800">
+      <a:lvl7pPr marL="2743200" algn="l" defTabSz="914400" rtl="0" eaLnBrk="1" latinLnBrk="0" hangingPunct="1">
+        <a:defRPr sz="1800" kern="1200">
           <a:solidFill>
             <a:schemeClr val="tx1"/>
           </a:solidFill>
@@ -3039,8 +3239,8 @@
           <a:cs typeface="+mn-cs"/>
         </a:defRPr>
       </a:lvl7pPr>
-      <a:lvl8pPr algn="l" defTabSz="914400" eaLnBrk="1" hangingPunct="1" latinLnBrk="0" marL="3200400" rtl="0">
-        <a:defRPr kern="1200" sz="1800">
+      <a:lvl8pPr marL="3200400" algn="l" defTabSz="914400" rtl="0" eaLnBrk="1" latinLnBrk="0" hangingPunct="1">
+        <a:defRPr sz="1800" kern="1200">
           <a:solidFill>
             <a:schemeClr val="tx1"/>
           </a:solidFill>
@@ -3049,8 +3249,8 @@
           <a:cs typeface="+mn-cs"/>
         </a:defRPr>
       </a:lvl8pPr>
-      <a:lvl9pPr algn="l" defTabSz="914400" eaLnBrk="1" hangingPunct="1" latinLnBrk="0" marL="3657600" rtl="0">
-        <a:defRPr kern="1200" sz="1800">
+      <a:lvl9pPr marL="3657600" algn="l" defTabSz="914400" rtl="0" eaLnBrk="1" latinLnBrk="0" hangingPunct="1">
+        <a:defRPr sz="1800" kern="1200">
           <a:solidFill>
             <a:schemeClr val="tx1"/>
           </a:solidFill>
@@ -3140,6 +3340,384 @@
 </p:sld>
 </file>
 
+<file path=ppt/slides/slide10.xml><?xml version="1.0" encoding="utf-8"?>
+<p:sld xmlns:a="http://schemas.openxmlformats.org/drawingml/2006/main" xmlns:p="http://schemas.openxmlformats.org/presentationml/2006/main" xmlns:r="http://schemas.openxmlformats.org/officeDocument/2006/relationships">
+  <p:cSld>
+    <p:spTree>
+      <p:nvGrpSpPr>
+        <p:cNvPr id="1" name=""/>
+        <p:cNvGrpSpPr/>
+        <p:nvPr/>
+      </p:nvGrpSpPr>
+      <p:grpSpPr>
+        <a:xfrm>
+          <a:off x="0" y="0"/>
+          <a:ext cx="0" cy="0"/>
+          <a:chOff x="0" y="0"/>
+          <a:chExt cx="0" cy="0"/>
+        </a:xfrm>
+      </p:grpSpPr>
+      <p:sp>
+        <p:nvSpPr>
+          <p:cNvPr id="2" name="Title 1"/>
+          <p:cNvSpPr>
+            <a:spLocks noGrp="1"/>
+          </p:cNvSpPr>
+          <p:nvPr>
+            <p:ph type="title"/>
+          </p:nvPr>
+        </p:nvSpPr>
+        <p:spPr/>
+        <p:txBody>
+          <a:bodyPr/>
+          <a:lstStyle/>
+          <a:p>
+            <a:r>
+              <a:rPr dirty="0" lang="en-US" smtClean="0"/>
+              <a:t>GIF Logo</a:t>
+            </a:r>
+            <a:endParaRPr dirty="0" lang="en-US"/>
+          </a:p>
+        </p:txBody>
+      </p:sp>
+      <p:pic>
+        <p:nvPicPr>
+          <p:cNvPr id="10" name="Content Placeholder 3"/>
+          <p:cNvPicPr>
+            <a:picLocks noChangeAspect="1" noGrp="1"/>
+          </p:cNvPicPr>
+          <p:nvPr>
+            <p:ph idx="1"/>
+          </p:nvPr>
+        </p:nvPicPr>
+        <p:blipFill>
+          <a:blip r:embed="rId2">
+            <a:extLst>
+              <a:ext uri="{28A0092B-C50C-407E-A947-70E740481C1C}">
+                <a14:useLocalDpi xmlns:a14="http://schemas.microsoft.com/office/drawing/2010/main" val="0"/>
+              </a:ext>
+            </a:extLst>
+          </a:blip>
+          <a:stretch>
+            <a:fillRect/>
+          </a:stretch>
+        </p:blipFill>
+        <p:spPr>
+          <a:xfrm>
+            <a:off x="3908456" y="1825625"/>
+            <a:ext cx="4351338" cy="4351338"/>
+          </a:xfrm>
+          <a:prstGeom prst="rect">
+            <a:avLst/>
+          </a:prstGeom>
+        </p:spPr>
+      </p:pic>
+    </p:spTree>
+    <p:extLst>
+      <p:ext uri="{BB962C8B-B14F-4D97-AF65-F5344CB8AC3E}">
+        <p14:creationId xmlns:p14="http://schemas.microsoft.com/office/powerpoint/2010/main" val="1231192379"/>
+      </p:ext>
+    </p:extLst>
+  </p:cSld>
+  <p:clrMapOvr>
+    <a:masterClrMapping/>
+  </p:clrMapOvr>
+</p:sld>
+</file>
+
+<file path=ppt/slides/slide11.xml><?xml version="1.0" encoding="utf-8"?>
+<p:sld xmlns:a="http://schemas.openxmlformats.org/drawingml/2006/main" xmlns:p="http://schemas.openxmlformats.org/presentationml/2006/main" xmlns:r="http://schemas.openxmlformats.org/officeDocument/2006/relationships">
+  <p:cSld>
+    <p:spTree>
+      <p:nvGrpSpPr>
+        <p:cNvPr id="1" name=""/>
+        <p:cNvGrpSpPr/>
+        <p:nvPr/>
+      </p:nvGrpSpPr>
+      <p:grpSpPr>
+        <a:xfrm>
+          <a:off x="0" y="0"/>
+          <a:ext cx="0" cy="0"/>
+          <a:chOff x="0" y="0"/>
+          <a:chExt cx="0" cy="0"/>
+        </a:xfrm>
+      </p:grpSpPr>
+      <p:sp>
+        <p:nvSpPr>
+          <p:cNvPr id="2" name="Title 1"/>
+          <p:cNvSpPr>
+            <a:spLocks noGrp="1"/>
+          </p:cNvSpPr>
+          <p:nvPr>
+            <p:ph type="title"/>
+          </p:nvPr>
+        </p:nvSpPr>
+        <p:spPr/>
+        <p:txBody>
+          <a:bodyPr/>
+          <a:lstStyle/>
+          <a:p>
+            <a:r>
+              <a:rPr dirty="0" lang="en-US" smtClean="0"/>
+              <a:t>Why Android?</a:t>
+            </a:r>
+            <a:endParaRPr dirty="0" lang="en-US"/>
+          </a:p>
+        </p:txBody>
+      </p:sp>
+      <p:sp>
+        <p:nvSpPr>
+          <p:cNvPr id="10" name="Content Placeholder 2"/>
+          <p:cNvSpPr>
+            <a:spLocks noGrp="1"/>
+          </p:cNvSpPr>
+          <p:nvPr>
+            <p:ph idx="1"/>
+          </p:nvPr>
+        </p:nvSpPr>
+        <p:spPr/>
+        <p:txBody>
+          <a:bodyPr/>
+          <a:lstStyle/>
+          <a:p>
+            <a:pPr marL="0" indent="0">
+              <a:spcBef>
+                <a:spcPts val="0"/>
+              </a:spcBef>
+            </a:pPr>
+            <a:r>
+              <a:rPr dirty="0" lang="en-US" smtClean="0"/>
+              <a:t>Its great!</a:t>
+            </a:r>
+          </a:p>
+          <!--<a:endParaRPr lang="en-US"/>-->
+          <a:p>
+            <a:pPr marL="0" indent="0">
+              <a:spcBef>
+                <a:spcPts val="0"/>
+              </a:spcBef>
+            </a:pPr>
+            <a:r>
+              <a:rPr dirty="0" lang="en-US" smtClean="0"/>
+              <a:t>Its sweet!</a:t>
+            </a:r>
+          </a:p>
+          <!--<a:endParaRPr lang="en-US"/>-->
+        </p:txBody>
+      </p:sp>
+    </p:spTree>
+    <p:extLst>
+      <p:ext uri="{BB962C8B-B14F-4D97-AF65-F5344CB8AC3E}">
+        <p14:creationId xmlns:p14="http://schemas.microsoft.com/office/powerpoint/2010/main" val="1231192379"/>
+      </p:ext>
+    </p:extLst>
+  </p:cSld>
+  <p:clrMapOvr>
+    <a:masterClrMapping/>
+  </p:clrMapOvr>
+</p:sld>
+</file>
+
+<file path=ppt/slides/slide12.xml><?xml version="1.0" encoding="utf-8"?>
+<p:sld xmlns:a="http://schemas.openxmlformats.org/drawingml/2006/main" xmlns:p="http://schemas.openxmlformats.org/presentationml/2006/main" xmlns:r="http://schemas.openxmlformats.org/officeDocument/2006/relationships">
+  <p:cSld>
+    <p:spTree>
+      <p:nvGrpSpPr>
+        <p:cNvPr id="1" name=""/>
+        <p:cNvGrpSpPr/>
+        <p:nvPr/>
+      </p:nvGrpSpPr>
+      <p:grpSpPr>
+        <a:xfrm>
+          <a:off x="0" y="0"/>
+          <a:ext cx="0" cy="0"/>
+          <a:chOff x="0" y="0"/>
+          <a:chExt cx="0" cy="0"/>
+        </a:xfrm>
+      </p:grpSpPr>
+      <p:sp>
+        <p:nvSpPr>
+          <p:cNvPr id="2" name="Title 1"/>
+          <p:cNvSpPr>
+            <a:spLocks noGrp="1"/>
+          </p:cNvSpPr>
+          <p:nvPr>
+            <p:ph type="title"/>
+          </p:nvPr>
+        </p:nvSpPr>
+        <p:spPr/>
+        <p:txBody>
+          <a:bodyPr/>
+          <a:lstStyle/>
+          <a:p>
+            <a:r>
+              <a:rPr dirty="0" lang="en-US" smtClean="0"/>
+              <a:t>foo bar slide</a:t>
+            </a:r>
+            <a:endParaRPr dirty="0" lang="en-US"/>
+          </a:p>
+        </p:txBody>
+      </p:sp>
+      <p:pic>
+        <p:nvPicPr>
+          <p:cNvPr id="10" name="Content Placeholder 3"/>
+          <p:cNvPicPr>
+            <a:picLocks noChangeAspect="1" noGrp="1"/>
+          </p:cNvPicPr>
+          <p:nvPr>
+            <p:ph idx="14"/>
+          </p:nvPr>
+        </p:nvPicPr>
+        <p:blipFill>
+          <a:blip r:embed="rId2">
+            <a:extLst>
+              <a:ext uri="{28A0092B-C50C-407E-A947-70E740481C1C}">
+                <a14:useLocalDpi xmlns:a14="http://schemas.microsoft.com/office/drawing/2010/main" val="0"/>
+              </a:ext>
+            </a:extLst>
+          </a:blip>
+          <a:stretch>
+            <a:fillRect/>
+          </a:stretch>
+        </p:blipFill>
+        <p:spPr>
+          <a:xfrm>
+            <a:off x="838200" y="1885950"/>
+            <a:ext cx="2874433" cy="2155825"/>
+          </a:xfrm>
+          <a:prstGeom prst="rect">
+            <a:avLst/>
+          </a:prstGeom>
+        </p:spPr>
+      </p:pic>
+      <p:pic>
+        <p:nvPicPr>
+          <p:cNvPr id="11" name="Content Placeholder 3"/>
+          <p:cNvPicPr>
+            <a:picLocks noChangeAspect="1" noGrp="1"/>
+          </p:cNvPicPr>
+          <p:nvPr>
+            <p:ph idx="14"/>
+          </p:nvPr>
+        </p:nvPicPr>
+        <p:blipFill>
+          <a:blip r:embed="rId3">
+            <a:extLst>
+              <a:ext uri="{28A0092B-C50C-407E-A947-70E740481C1C}">
+                <a14:useLocalDpi xmlns:a14="http://schemas.microsoft.com/office/drawing/2010/main" val="0"/>
+              </a:ext>
+            </a:extLst>
+          </a:blip>
+          <a:stretch>
+            <a:fillRect/>
+          </a:stretch>
+        </p:blipFill>
+        <p:spPr>
+          <a:xfrm>
+            <a:off x="838200" y="4041775"/>
+            <a:ext cx="2874433" cy="2155825"/>
+          </a:xfrm>
+          <a:prstGeom prst="rect">
+            <a:avLst/>
+          </a:prstGeom>
+        </p:spPr>
+      </p:pic>
+      <p:sp>
+        <p:nvSpPr>
+          <p:cNvPr id="12" name="Content Placeholder 2"/>
+          <p:cNvSpPr>
+            <a:spLocks noGrp="1"/>
+          </p:cNvSpPr>
+          <p:nvPr>
+            <p:ph idx="13"/>
+          </p:nvPr>
+        </p:nvSpPr>
+        <p:spPr/>
+        <p:txBody>
+          <a:bodyPr>
+            <a:normAutofit/>
+          </a:bodyPr>
+          <a:lstStyle/>
+          <a:p>
+            <a:pPr marL="0" indent="0">
+              <a:spcBef>
+                <a:spcPts val="0"/>
+              </a:spcBef>
+              <a:buNone/>
+            </a:pPr>
+            <a:r>
+              <a:rPr dirty="0" lang="en-US" smtClean="0"/>
+              <a:t>long description line goes here</a:t>
+            </a:r>
+          </a:p>
+          <!--<a:endParaRPr lang="en-US"/>-->
+        </p:txBody>
+      </p:sp>
+      <p:sp>
+        <p:nvSpPr>
+          <p:cNvPr id="13" name="Content Placeholder 2"/>
+          <p:cNvSpPr>
+            <a:spLocks noGrp="1"/>
+          </p:cNvSpPr>
+          <p:nvPr>
+            <p:ph idx="16"/>
+          </p:nvPr>
+        </p:nvSpPr>
+        <p:spPr/>
+        <p:txBody>
+          <a:bodyPr>
+            <a:normAutofit/>
+          </a:bodyPr>
+          <a:lstStyle/>
+          <a:p>
+            <a:pPr marL="0" indent="0">
+              <a:spcBef>
+                <a:spcPts val="0"/>
+              </a:spcBef>
+              <a:buNone/>
+            </a:pPr>
+            <a:r>
+              <a:rPr dirty="0" lang="en-US" sz="2400" smtClean="0">
+                <a:solidFill>
+                  <a:srgbClr val="2d97d3"/>
+                </a:solidFill>
+              </a:rPr>
+              <a:t>foo</a:t>
+            </a:r>
+            <a:r>
+              <a:rPr dirty="0" lang="en-US" smtClean="0"/>
+              <a:t>bar</a:t>
+            </a:r>
+          </a:p>
+          <!--<a:endParaRPr lang="en-US"/>-->
+          <a:p>
+            <a:pPr marL="0" indent="0">
+              <a:spcBef>
+                <a:spcPts val="0"/>
+              </a:spcBef>
+              <a:buNone/>
+            </a:pPr>
+            <a:r>
+              <a:rPr dirty="0" lang="en-US" smtClean="0"/>
+              <a:t>baz◼</a:t>
+            </a:r>
+          </a:p>
+          <!--<a:endParaRPr lang="en-US"/>-->
+        </p:txBody>
+      </p:sp>
+    </p:spTree>
+    <p:extLst>
+      <p:ext uri="{BB962C8B-B14F-4D97-AF65-F5344CB8AC3E}">
+        <p14:creationId xmlns:p14="http://schemas.microsoft.com/office/powerpoint/2010/main" val="1231192379"/>
+      </p:ext>
+    </p:extLst>
+  </p:cSld>
+  <p:clrMapOvr>
+    <a:masterClrMapping/>
+  </p:clrMapOvr>
+</p:sld>
+</file>
+
 <file path=ppt/slides/slide2.xml><?xml version="1.0" encoding="utf-8"?>
 <p:sld xmlns:a="http://schemas.openxmlformats.org/drawingml/2006/main" xmlns:p="http://schemas.openxmlformats.org/presentationml/2006/main" xmlns:r="http://schemas.openxmlformats.org/officeDocument/2006/relationships">
   <p:cSld>
@@ -3182,7 +3760,7 @@
       </p:sp>
       <p:sp>
         <p:nvSpPr>
-          <p:cNvPr id="3" name="Content Placeholder 2"/>
+          <p:cNvPr id="10" name="Content Placeholder 2"/>
           <p:cNvSpPr>
             <a:spLocks noGrp="1"/>
           </p:cNvSpPr>
@@ -3195,18 +3773,29 @@
           <a:bodyPr/>
           <a:lstStyle/>
           <a:p>
+            <a:pPr marL="0" indent="0">
+              <a:spcBef>
+                <a:spcPts val="0"/>
+              </a:spcBef>
+            </a:pPr>
             <a:r>
               <a:rPr dirty="0" lang="en-US" smtClean="0"/>
               <a:t>Its cool!</a:t>
             </a:r>
           </a:p>
-          <a:p>
+          <!--<a:endParaRPr lang="en-US"/>-->
+          <a:p>
+            <a:pPr marL="0" indent="0">
+              <a:spcBef>
+                <a:spcPts val="0"/>
+              </a:spcBef>
+            </a:pPr>
             <a:r>
               <a:rPr dirty="0" lang="en-US" smtClean="0"/>
               <a:t>Its light!</a:t>
             </a:r>
-            <a:endParaRPr lang="en-US"/>
-          </a:p>
+          </a:p>
+          <!--<a:endParaRPr lang="en-US"/>-->
         </p:txBody>
       </p:sp>
     </p:spTree>
@@ -3264,7 +3853,7 @@
       </p:sp>
       <p:sp>
         <p:nvSpPr>
-          <p:cNvPr id="3" name="Content Placeholder 2"/>
+          <p:cNvPr id="10" name="Content Placeholder 2"/>
           <p:cNvSpPr>
             <a:spLocks noGrp="1"/>
           </p:cNvSpPr>
@@ -3277,18 +3866,29 @@
           <a:bodyPr/>
           <a:lstStyle/>
           <a:p>
+            <a:pPr marL="0" indent="0">
+              <a:spcBef>
+                <a:spcPts val="0"/>
+              </a:spcBef>
+            </a:pPr>
             <a:r>
               <a:rPr dirty="0" lang="en-US" smtClean="0"/>
               <a:t>Its fast!</a:t>
             </a:r>
           </a:p>
-          <a:p>
+          <!--<a:endParaRPr lang="en-US"/>-->
+          <a:p>
+            <a:pPr marL="0" indent="0">
+              <a:spcBef>
+                <a:spcPts val="0"/>
+              </a:spcBef>
+            </a:pPr>
             <a:r>
               <a:rPr dirty="0" lang="en-US" smtClean="0"/>
               <a:t>Its cheap!</a:t>
             </a:r>
-            <a:endParaRPr lang="en-US"/>
-          </a:p>
+          </a:p>
+          <!--<a:endParaRPr lang="en-US"/>-->
         </p:txBody>
       </p:sp>
     </p:spTree>
@@ -3346,7 +3946,7 @@
       </p:sp>
       <p:pic>
         <p:nvPicPr>
-          <p:cNvPr id="4" name="Content Placeholder 3"/>
+          <p:cNvPr id="10" name="Content Placeholder 3"/>
           <p:cNvPicPr>
             <a:picLocks noChangeAspect="1" noGrp="1"/>
           </p:cNvPicPr>
@@ -3368,8 +3968,8 @@
         </p:blipFill>
         <p:spPr>
           <a:xfrm>
-            <a:off x="2159000" y="1524000"/>
-            <a:ext cx="4826000" cy="1689100"/>
+            <a:off x="3183233" y="1825625"/>
+            <a:ext cx="5801784" cy="4351338"/>
           </a:xfrm>
           <a:prstGeom prst="rect">
             <a:avLst/>
@@ -3379,7 +3979,7 @@
     </p:spTree>
     <p:extLst>
       <p:ext uri="{BB962C8B-B14F-4D97-AF65-F5344CB8AC3E}">
-        <p14:creationId xmlns:p14="http://schemas.microsoft.com/office/powerpoint/2010/main" val="1474098577"/>
+        <p14:creationId xmlns:p14="http://schemas.microsoft.com/office/powerpoint/2010/main" val="1231192379"/>
       </p:ext>
     </p:extLst>
   </p:cSld>
@@ -3423,20 +4023,64 @@
           <a:p>
             <a:r>
               <a:rPr dirty="0" lang="en-US" smtClean="0"/>
-              <a:t>PNG Logo</a:t>
+              <a:t>Text Pic Split</a:t>
             </a:r>
             <a:endParaRPr dirty="0" lang="en-US"/>
           </a:p>
+        </p:txBody>
+      </p:sp>
+      <p:sp>
+        <p:nvSpPr>
+          <p:cNvPr id="10" name="Content Placeholder 2"/>
+          <p:cNvSpPr>
+            <a:spLocks noGrp="1"/>
+          </p:cNvSpPr>
+          <p:nvPr>
+            <p:ph idx="1"/>
+          </p:nvPr>
+        </p:nvSpPr>
+        <p:spPr/>
+        <p:txBody>
+          <a:bodyPr>
+            <a:normAutofit/>
+          </a:bodyPr>
+          <a:lstStyle/>
+          <a:p>
+            <a:pPr marL="0" indent="0">
+              <a:spcBef>
+                <a:spcPts val="0"/>
+              </a:spcBef>
+              <a:buNone/>
+            </a:pPr>
+            <a:r>
+              <a:rPr dirty="0" lang="en-US" smtClean="0"/>
+              <a:t>Here is a string</a:t>
+            </a:r>
+          </a:p>
+          <!--<a:endParaRPr lang="en-US"/>-->
+          <a:p>
+            <a:pPr marL="0" indent="0">
+              <a:spcBef>
+                <a:spcPts val="0"/>
+              </a:spcBef>
+              <a:buNone/>
+            </a:pPr>
+            <a:r>
+              <a:rPr dirty="0" lang="en-US" smtClean="0"/>
+              <a:t>here is another</a:t>
+            </a:r>
+          </a:p>
+          <!--<a:endParaRPr lang="en-US"/>-->
         </p:txBody>
       </p:sp>
       <p:pic>
         <p:nvPicPr>
-          <p:cNvPr id="4" name="Content Placeholder 3"/>
+          <p:cNvPr id="11" name="Content Placeholder 3"/>
           <p:cNvPicPr>
             <a:picLocks noChangeAspect="1" noGrp="1"/>
           </p:cNvPicPr>
           <p:nvPr>
-            <p:ph idx="1"/>
+            <p:ph idx="2"/>
           </p:nvPr>
         </p:nvPicPr>
         <p:blipFill>
@@ -3453,8 +4097,8 @@
         </p:blipFill>
         <p:spPr>
           <a:xfrm>
-            <a:off x="2794000" y="1524000"/>
-            <a:ext cx="3556000" cy="2667000"/>
+            <a:off x="6172200" y="1825625"/>
+            <a:ext cx="5181600" cy="3886200"/>
           </a:xfrm>
           <a:prstGeom prst="rect">
             <a:avLst/>
@@ -3464,7 +4108,7 @@
     </p:spTree>
     <p:extLst>
       <p:ext uri="{BB962C8B-B14F-4D97-AF65-F5344CB8AC3E}">
-        <p14:creationId xmlns:p14="http://schemas.microsoft.com/office/powerpoint/2010/main" val="1474098577"/>
+        <p14:creationId xmlns:p14="http://schemas.microsoft.com/office/powerpoint/2010/main" val="1231192379"/>
       </p:ext>
     </p:extLst>
   </p:cSld>
@@ -3508,7 +4152,7 @@
           <a:p>
             <a:r>
               <a:rPr dirty="0" lang="en-US" smtClean="0"/>
-              <a:t>GIF Logo</a:t>
+              <a:t>PNG Logo</a:t>
             </a:r>
             <a:endParaRPr dirty="0" lang="en-US"/>
           </a:p>
@@ -3516,7 +4160,7 @@
       </p:sp>
       <p:pic>
         <p:nvPicPr>
-          <p:cNvPr id="4" name="Content Placeholder 3"/>
+          <p:cNvPr id="10" name="Content Placeholder 3"/>
           <p:cNvPicPr>
             <a:picLocks noChangeAspect="1" noGrp="1"/>
           </p:cNvPicPr>
@@ -3538,8 +4182,8 @@
         </p:blipFill>
         <p:spPr>
           <a:xfrm>
-            <a:off x="124200" y="3356451"/>
-            <a:ext cx="2895600" cy="1013460"/>
+            <a:off x="3183233" y="1825625"/>
+            <a:ext cx="5801784" cy="4351338"/>
           </a:xfrm>
           <a:prstGeom prst="rect">
             <a:avLst/>
@@ -3549,7 +4193,7 @@
     </p:spTree>
     <p:extLst>
       <p:ext uri="{BB962C8B-B14F-4D97-AF65-F5344CB8AC3E}">
-        <p14:creationId xmlns:p14="http://schemas.microsoft.com/office/powerpoint/2010/main" val="1474098577"/>
+        <p14:creationId xmlns:p14="http://schemas.microsoft.com/office/powerpoint/2010/main" val="1231192379"/>
       </p:ext>
     </p:extLst>
   </p:cSld>
@@ -3593,39 +4237,308 @@
           <a:p>
             <a:r>
               <a:rPr dirty="0" lang="en-US" smtClean="0"/>
-              <a:t>Why Android?</a:t>
+              <a:t>Pic Desc</a:t>
             </a:r>
             <a:endParaRPr dirty="0" lang="en-US"/>
           </a:p>
         </p:txBody>
       </p:sp>
-      <p:sp>
-        <p:nvSpPr>
-          <p:cNvPr id="3" name="Content Placeholder 2"/>
-          <p:cNvSpPr>
-            <a:spLocks noGrp="1"/>
-          </p:cNvSpPr>
+      <p:pic>
+        <p:nvPicPr>
+          <p:cNvPr id="10" name="Content Placeholder 3"/>
+          <p:cNvPicPr>
+            <a:picLocks noChangeAspect="1" noGrp="1"/>
+          </p:cNvPicPr>
           <p:nvPr>
             <p:ph idx="1"/>
           </p:nvPr>
-        </p:nvSpPr>
-        <p:spPr/>
-        <p:txBody>
-          <a:bodyPr/>
-          <a:lstStyle/>
-          <a:p>
+        </p:nvPicPr>
+        <p:blipFill>
+          <a:blip r:embed="rId2">
+            <a:extLst>
+              <a:ext uri="{28A0092B-C50C-407E-A947-70E740481C1C}">
+                <a14:useLocalDpi xmlns:a14="http://schemas.microsoft.com/office/drawing/2010/main" val="0"/>
+              </a:ext>
+            </a:extLst>
+          </a:blip>
+          <a:stretch>
+            <a:fillRect/>
+          </a:stretch>
+        </p:blipFill>
+        <p:spPr>
+          <a:xfrm>
+            <a:off x="5183188" y="987425"/>
+            <a:ext cx="6172200" cy="4629150"/>
+          </a:xfrm>
+          <a:prstGeom prst="rect">
+            <a:avLst/>
+          </a:prstGeom>
+        </p:spPr>
+      </p:pic>
+      <p:sp>
+        <p:nvSpPr>
+          <p:cNvPr id="11" name="Content Placeholder 2"/>
+          <p:cNvSpPr>
+            <a:spLocks noGrp="1"/>
+          </p:cNvSpPr>
+          <p:nvPr>
+            <p:ph idx="2"/>
+          </p:nvPr>
+        </p:nvSpPr>
+        <p:spPr/>
+        <p:txBody>
+          <a:bodyPr/>
+          <a:lstStyle/>
+          <a:p>
+            <a:pPr marL="0" indent="0">
+              <a:spcBef>
+                <a:spcPts val="0"/>
+              </a:spcBef>
+            </a:pPr>
             <a:r>
               <a:rPr dirty="0" lang="en-US" smtClean="0"/>
-              <a:t>Its great!</a:t>
-            </a:r>
-          </a:p>
-          <a:p>
+              <a:t>Here is a string</a:t>
+            </a:r>
+          </a:p>
+          <!--<a:endParaRPr lang="en-US"/>-->
+          <a:p>
+            <a:pPr marL="0" indent="0">
+              <a:spcBef>
+                <a:spcPts val="0"/>
+              </a:spcBef>
+            </a:pPr>
             <a:r>
               <a:rPr dirty="0" lang="en-US" smtClean="0"/>
-              <a:t>Its sweet!</a:t>
-            </a:r>
-            <a:endParaRPr lang="en-US"/>
-          </a:p>
+              <a:t>here is another</a:t>
+            </a:r>
+          </a:p>
+          <!--<a:endParaRPr lang="en-US"/>-->
+        </p:txBody>
+      </p:sp>
+    </p:spTree>
+    <p:extLst>
+      <p:ext uri="{BB962C8B-B14F-4D97-AF65-F5344CB8AC3E}">
+        <p14:creationId xmlns:p14="http://schemas.microsoft.com/office/powerpoint/2010/main" val="1231192379"/>
+      </p:ext>
+    </p:extLst>
+  </p:cSld>
+  <p:clrMapOvr>
+    <a:masterClrMapping/>
+  </p:clrMapOvr>
+</p:sld>
+</file>
+
+<file path=ppt/slides/slide8.xml><?xml version="1.0" encoding="utf-8"?>
+<p:sld xmlns:a="http://schemas.openxmlformats.org/drawingml/2006/main" xmlns:p="http://schemas.openxmlformats.org/presentationml/2006/main" xmlns:r="http://schemas.openxmlformats.org/officeDocument/2006/relationships">
+  <p:cSld>
+    <p:spTree>
+      <p:nvGrpSpPr>
+        <p:cNvPr id="1" name=""/>
+        <p:cNvGrpSpPr/>
+        <p:nvPr/>
+      </p:nvGrpSpPr>
+      <p:grpSpPr>
+        <a:xfrm>
+          <a:off x="0" y="0"/>
+          <a:ext cx="0" cy="0"/>
+          <a:chOff x="0" y="0"/>
+          <a:chExt cx="0" cy="0"/>
+        </a:xfrm>
+      </p:grpSpPr>
+      <p:sp>
+        <p:nvSpPr>
+          <p:cNvPr id="2" name="Title 1"/>
+          <p:cNvSpPr>
+            <a:spLocks noGrp="1"/>
+          </p:cNvSpPr>
+          <p:nvPr>
+            <p:ph type="title"/>
+          </p:nvPr>
+        </p:nvSpPr>
+        <p:spPr/>
+        <p:txBody>
+          <a:bodyPr/>
+          <a:lstStyle/>
+          <a:p>
+            <a:r>
+              <a:rPr dirty="0" lang="en-US" smtClean="0"/>
+              <a:t>JPG Logo</a:t>
+            </a:r>
+            <a:endParaRPr dirty="0" lang="en-US"/>
+          </a:p>
+        </p:txBody>
+      </p:sp>
+      <p:pic>
+        <p:nvPicPr>
+          <p:cNvPr id="10" name="Content Placeholder 3"/>
+          <p:cNvPicPr>
+            <a:picLocks noChangeAspect="1" noGrp="1"/>
+          </p:cNvPicPr>
+          <p:nvPr>
+            <p:ph idx="1"/>
+          </p:nvPr>
+        </p:nvPicPr>
+        <p:blipFill>
+          <a:blip r:embed="rId2">
+            <a:extLst>
+              <a:ext uri="{28A0092B-C50C-407E-A947-70E740481C1C}">
+                <a14:useLocalDpi xmlns:a14="http://schemas.microsoft.com/office/drawing/2010/main" val="0"/>
+              </a:ext>
+            </a:extLst>
+          </a:blip>
+          <a:stretch>
+            <a:fillRect/>
+          </a:stretch>
+        </p:blipFill>
+        <p:spPr>
+          <a:xfrm>
+            <a:off x="5183188" y="987425"/>
+            <a:ext cx="6172200" cy="2160270"/>
+          </a:xfrm>
+          <a:prstGeom prst="rect">
+            <a:avLst/>
+          </a:prstGeom>
+        </p:spPr>
+      </p:pic>
+      <p:sp>
+        <p:nvSpPr>
+          <p:cNvPr id="11" name="Content Placeholder 2"/>
+          <p:cNvSpPr>
+            <a:spLocks noGrp="1"/>
+          </p:cNvSpPr>
+          <p:nvPr>
+            <p:ph idx="2"/>
+          </p:nvPr>
+        </p:nvSpPr>
+        <p:spPr/>
+        <p:txBody>
+          <a:bodyPr/>
+          <a:lstStyle/>
+          <a:p>
+            <a:pPr marL="0" indent="0">
+              <a:spcBef>
+                <a:spcPts val="0"/>
+              </a:spcBef>
+            </a:pPr>
+            <a:r>
+              <a:rPr dirty="0" lang="en-US" smtClean="0"/>
+              <a:t>descriptions</a:t>
+            </a:r>
+          </a:p>
+          <!--<a:endParaRPr lang="en-US"/>-->
+        </p:txBody>
+      </p:sp>
+    </p:spTree>
+    <p:extLst>
+      <p:ext uri="{BB962C8B-B14F-4D97-AF65-F5344CB8AC3E}">
+        <p14:creationId xmlns:p14="http://schemas.microsoft.com/office/powerpoint/2010/main" val="1231192379"/>
+      </p:ext>
+    </p:extLst>
+  </p:cSld>
+  <p:clrMapOvr>
+    <a:masterClrMapping/>
+  </p:clrMapOvr>
+</p:sld>
+</file>
+
+<file path=ppt/slides/slide9.xml><?xml version="1.0" encoding="utf-8"?>
+<p:sld xmlns:a="http://schemas.openxmlformats.org/drawingml/2006/main" xmlns:p="http://schemas.openxmlformats.org/presentationml/2006/main" xmlns:r="http://schemas.openxmlformats.org/officeDocument/2006/relationships">
+  <p:cSld>
+    <p:spTree>
+      <p:nvGrpSpPr>
+        <p:cNvPr id="1" name=""/>
+        <p:cNvGrpSpPr/>
+        <p:nvPr/>
+      </p:nvGrpSpPr>
+      <p:grpSpPr>
+        <a:xfrm>
+          <a:off x="0" y="0"/>
+          <a:ext cx="0" cy="0"/>
+          <a:chOff x="0" y="0"/>
+          <a:chExt cx="0" cy="0"/>
+        </a:xfrm>
+      </p:grpSpPr>
+      <p:sp>
+        <p:nvSpPr>
+          <p:cNvPr id="2" name="Title 1"/>
+          <p:cNvSpPr>
+            <a:spLocks noGrp="1"/>
+          </p:cNvSpPr>
+          <p:nvPr>
+            <p:ph type="title"/>
+          </p:nvPr>
+        </p:nvSpPr>
+        <p:spPr/>
+        <p:txBody>
+          <a:bodyPr/>
+          <a:lstStyle/>
+          <a:p>
+            <a:r>
+              <a:rPr dirty="0" lang="en-US" smtClean="0"/>
+              <a:t>another</a:t>
+            </a:r>
+            <a:endParaRPr dirty="0" lang="en-US"/>
+          </a:p>
+        </p:txBody>
+      </p:sp>
+      <p:pic>
+        <p:nvPicPr>
+          <p:cNvPr id="10" name="Content Placeholder 3"/>
+          <p:cNvPicPr>
+            <a:picLocks noChangeAspect="1" noGrp="1"/>
+          </p:cNvPicPr>
+          <p:nvPr>
+            <p:ph idx="1"/>
+          </p:nvPr>
+        </p:nvPicPr>
+        <p:blipFill>
+          <a:blip r:embed="rId2">
+            <a:extLst>
+              <a:ext uri="{28A0092B-C50C-407E-A947-70E740481C1C}">
+                <a14:useLocalDpi xmlns:a14="http://schemas.microsoft.com/office/drawing/2010/main" val="0"/>
+              </a:ext>
+            </a:extLst>
+          </a:blip>
+          <a:stretch>
+            <a:fillRect/>
+          </a:stretch>
+        </p:blipFill>
+        <p:spPr>
+          <a:xfrm>
+            <a:off x="5183188" y="987425"/>
+            <a:ext cx="4873625" cy="4873625"/>
+          </a:xfrm>
+          <a:prstGeom prst="rect">
+            <a:avLst/>
+          </a:prstGeom>
+        </p:spPr>
+      </p:pic>
+      <p:sp>
+        <p:nvSpPr>
+          <p:cNvPr id="11" name="Content Placeholder 2"/>
+          <p:cNvSpPr>
+            <a:spLocks noGrp="1"/>
+          </p:cNvSpPr>
+          <p:nvPr>
+            <p:ph idx="2"/>
+          </p:nvPr>
+        </p:nvSpPr>
+        <p:spPr/>
+        <p:txBody>
+          <a:bodyPr/>
+          <a:lstStyle/>
+          <a:p>
+            <a:pPr marL="0" indent="0">
+              <a:spcBef>
+                <a:spcPts val="0"/>
+              </a:spcBef>
+            </a:pPr>
+            <a:r>
+              <a:rPr dirty="0" lang="en-US" smtClean="0"/>
+              <a:t>things</a:t>
+            </a:r>
+          </a:p>
+          <!--<a:endParaRPr lang="en-US"/>-->
         </p:txBody>
       </p:sp>
     </p:spTree>
@@ -3652,39 +4565,39 @@
         <a:sysClr val="window" lastClr="FFFFFF"/>
       </a:lt1>
       <a:dk2>
-        <a:srgbClr val="1F497D"/>
+        <a:srgbClr val="44546A"/>
       </a:dk2>
       <a:lt2>
-        <a:srgbClr val="EEECE1"/>
+        <a:srgbClr val="E7E6E6"/>
       </a:lt2>
       <a:accent1>
-        <a:srgbClr val="4F81BD"/>
+        <a:srgbClr val="5B9BD5"/>
       </a:accent1>
       <a:accent2>
-        <a:srgbClr val="C0504D"/>
+        <a:srgbClr val="ED7D31"/>
       </a:accent2>
       <a:accent3>
-        <a:srgbClr val="9BBB59"/>
+        <a:srgbClr val="A5A5A5"/>
       </a:accent3>
       <a:accent4>
-        <a:srgbClr val="8064A2"/>
+        <a:srgbClr val="FFC000"/>
       </a:accent4>
       <a:accent5>
-        <a:srgbClr val="4BACC6"/>
+        <a:srgbClr val="4472C4"/>
       </a:accent5>
       <a:accent6>
-        <a:srgbClr val="F79646"/>
+        <a:srgbClr val="70AD47"/>
       </a:accent6>
       <a:hlink>
-        <a:srgbClr val="0000FF"/>
+        <a:srgbClr val="0563C1"/>
       </a:hlink>
       <a:folHlink>
-        <a:srgbClr val="800080"/>
+        <a:srgbClr val="954F72"/>
       </a:folHlink>
     </a:clrScheme>
     <a:fontScheme name="Office">
       <a:majorFont>
-        <a:latin typeface="Calibri"/>
+        <a:latin typeface="Calibri Light" panose="020F0302020204030204"/>
         <a:ea typeface=""/>
         <a:cs typeface=""/>
         <a:font script="Jpan" typeface="ＭＳ Ｐゴシック"/>
@@ -3716,9 +4629,10 @@
         <a:font script="Mong" typeface="Mongolian Baiti"/>
         <a:font script="Viet" typeface="Times New Roman"/>
         <a:font script="Uigh" typeface="Microsoft Uighur"/>
+        <a:font script="Geor" typeface="Sylfaen"/>
       </a:majorFont>
       <a:minorFont>
-        <a:latin typeface="Calibri"/>
+        <a:latin typeface="Calibri" panose="020F0502020204030204"/>
         <a:ea typeface=""/>
         <a:cs typeface=""/>
         <a:font script="Jpan" typeface="ＭＳ Ｐゴシック"/>
@@ -3750,6 +4664,7 @@
         <a:font script="Mong" typeface="Mongolian Baiti"/>
         <a:font script="Viet" typeface="Arial"/>
         <a:font script="Uigh" typeface="Microsoft Uighur"/>
+        <a:font script="Geor" typeface="Sylfaen"/>
       </a:minorFont>
     </a:fontScheme>
     <a:fmtScheme name="Office">
@@ -3761,165 +4676,141 @@
           <a:gsLst>
             <a:gs pos="0">
               <a:schemeClr val="phClr">
-                <a:tint val="50000"/>
-                <a:satMod val="300000"/>
+                <a:lumMod val="110000"/>
+                <a:satMod val="105000"/>
+                <a:tint val="67000"/>
               </a:schemeClr>
             </a:gs>
-            <a:gs pos="35000">
+            <a:gs pos="50000">
               <a:schemeClr val="phClr">
-                <a:tint val="37000"/>
-                <a:satMod val="300000"/>
+                <a:lumMod val="105000"/>
+                <a:satMod val="103000"/>
+                <a:tint val="73000"/>
               </a:schemeClr>
             </a:gs>
             <a:gs pos="100000">
               <a:schemeClr val="phClr">
-                <a:tint val="15000"/>
-                <a:satMod val="350000"/>
+                <a:lumMod val="105000"/>
+                <a:satMod val="109000"/>
+                <a:tint val="81000"/>
               </a:schemeClr>
             </a:gs>
           </a:gsLst>
-          <a:lin ang="16200000" scaled="1"/>
+          <a:lin ang="5400000" scaled="0"/>
         </a:gradFill>
         <a:gradFill rotWithShape="1">
           <a:gsLst>
             <a:gs pos="0">
               <a:schemeClr val="phClr">
-                <a:shade val="51000"/>
-                <a:satMod val="130000"/>
+                <a:satMod val="103000"/>
+                <a:lumMod val="102000"/>
+                <a:tint val="94000"/>
               </a:schemeClr>
             </a:gs>
-            <a:gs pos="80000">
+            <a:gs pos="50000">
               <a:schemeClr val="phClr">
-                <a:shade val="93000"/>
-                <a:satMod val="130000"/>
+                <a:satMod val="110000"/>
+                <a:lumMod val="100000"/>
+                <a:shade val="100000"/>
               </a:schemeClr>
             </a:gs>
             <a:gs pos="100000">
               <a:schemeClr val="phClr">
-                <a:shade val="94000"/>
-                <a:satMod val="135000"/>
+                <a:lumMod val="99000"/>
+                <a:satMod val="120000"/>
+                <a:shade val="78000"/>
               </a:schemeClr>
             </a:gs>
           </a:gsLst>
-          <a:lin ang="16200000" scaled="0"/>
+          <a:lin ang="5400000" scaled="0"/>
         </a:gradFill>
       </a:fillStyleLst>
       <a:lnStyleLst>
-        <a:ln w="9525" cap="flat" cmpd="sng" algn="ctr">
-          <a:solidFill>
-            <a:schemeClr val="phClr">
-              <a:shade val="95000"/>
-              <a:satMod val="105000"/>
-            </a:schemeClr>
-          </a:solidFill>
-          <a:prstDash val="solid"/>
-        </a:ln>
-        <a:ln w="25400" cap="flat" cmpd="sng" algn="ctr">
+        <a:ln w="6350" cap="flat" cmpd="sng" algn="ctr">
           <a:solidFill>
             <a:schemeClr val="phClr"/>
           </a:solidFill>
           <a:prstDash val="solid"/>
+          <a:miter lim="800000"/>
         </a:ln>
-        <a:ln w="38100" cap="flat" cmpd="sng" algn="ctr">
+        <a:ln w="12700" cap="flat" cmpd="sng" algn="ctr">
           <a:solidFill>
             <a:schemeClr val="phClr"/>
           </a:solidFill>
           <a:prstDash val="solid"/>
+          <a:miter lim="800000"/>
+        </a:ln>
+        <a:ln w="19050" cap="flat" cmpd="sng" algn="ctr">
+          <a:solidFill>
+            <a:schemeClr val="phClr"/>
+          </a:solidFill>
+          <a:prstDash val="solid"/>
+          <a:miter lim="800000"/>
         </a:ln>
       </a:lnStyleLst>
       <a:effectStyleLst>
         <a:effectStyle>
+          <a:effectLst/>
+        </a:effectStyle>
+        <a:effectStyle>
+          <a:effectLst/>
+        </a:effectStyle>
+        <a:effectStyle>
           <a:effectLst>
-            <a:outerShdw blurRad="40000" dist="20000" dir="5400000" rotWithShape="0">
+            <a:outerShdw blurRad="57150" dist="19050" dir="5400000" algn="ctr" rotWithShape="0">
               <a:srgbClr val="000000">
-                <a:alpha val="38000"/>
+                <a:alpha val="63000"/>
               </a:srgbClr>
             </a:outerShdw>
           </a:effectLst>
-        </a:effectStyle>
-        <a:effectStyle>
-          <a:effectLst>
-            <a:outerShdw blurRad="40000" dist="23000" dir="5400000" rotWithShape="0">
-              <a:srgbClr val="000000">
-                <a:alpha val="35000"/>
-              </a:srgbClr>
-            </a:outerShdw>
-          </a:effectLst>
-        </a:effectStyle>
-        <a:effectStyle>
-          <a:effectLst>
-            <a:outerShdw blurRad="40000" dist="23000" dir="5400000" rotWithShape="0">
-              <a:srgbClr val="000000">
-                <a:alpha val="35000"/>
-              </a:srgbClr>
-            </a:outerShdw>
-          </a:effectLst>
-          <a:scene3d>
-            <a:camera prst="orthographicFront">
-              <a:rot lat="0" lon="0" rev="0"/>
-            </a:camera>
-            <a:lightRig rig="threePt" dir="t">
-              <a:rot lat="0" lon="0" rev="1200000"/>
-            </a:lightRig>
-          </a:scene3d>
-          <a:sp3d>
-            <a:bevelT w="63500" h="25400"/>
-          </a:sp3d>
         </a:effectStyle>
       </a:effectStyleLst>
       <a:bgFillStyleLst>
         <a:solidFill>
           <a:schemeClr val="phClr"/>
         </a:solidFill>
+        <a:solidFill>
+          <a:schemeClr val="phClr">
+            <a:tint val="95000"/>
+            <a:satMod val="170000"/>
+          </a:schemeClr>
+        </a:solidFill>
         <a:gradFill rotWithShape="1">
           <a:gsLst>
             <a:gs pos="0">
               <a:schemeClr val="phClr">
-                <a:tint val="40000"/>
-                <a:satMod val="350000"/>
+                <a:tint val="93000"/>
+                <a:satMod val="150000"/>
+                <a:shade val="98000"/>
+                <a:lumMod val="102000"/>
               </a:schemeClr>
             </a:gs>
-            <a:gs pos="40000">
+            <a:gs pos="50000">
               <a:schemeClr val="phClr">
-                <a:tint val="45000"/>
-                <a:shade val="99000"/>
-                <a:satMod val="350000"/>
+                <a:tint val="98000"/>
+                <a:satMod val="130000"/>
+                <a:shade val="90000"/>
+                <a:lumMod val="103000"/>
               </a:schemeClr>
             </a:gs>
             <a:gs pos="100000">
               <a:schemeClr val="phClr">
-                <a:shade val="20000"/>
-                <a:satMod val="255000"/>
+                <a:shade val="63000"/>
+                <a:satMod val="120000"/>
               </a:schemeClr>
             </a:gs>
           </a:gsLst>
-          <a:path path="circle">
-            <a:fillToRect l="50000" t="-80000" r="50000" b="180000"/>
-          </a:path>
-        </a:gradFill>
-        <a:gradFill rotWithShape="1">
-          <a:gsLst>
-            <a:gs pos="0">
-              <a:schemeClr val="phClr">
-                <a:tint val="80000"/>
-                <a:satMod val="300000"/>
-              </a:schemeClr>
-            </a:gs>
-            <a:gs pos="100000">
-              <a:schemeClr val="phClr">
-                <a:shade val="30000"/>
-                <a:satMod val="200000"/>
-              </a:schemeClr>
-            </a:gs>
-          </a:gsLst>
-          <a:path path="circle">
-            <a:fillToRect l="50000" t="50000" r="50000" b="50000"/>
-          </a:path>
+          <a:lin ang="5400000" scaled="0"/>
         </a:gradFill>
       </a:bgFillStyleLst>
     </a:fmtScheme>
   </a:themeElements>
   <a:objectDefaults/>
   <a:extraClrSchemeLst/>
+  <a:extLst>
+    <a:ext uri="{05A4C25C-085E-4340-85A3-A5531E510DB2}">
+      <thm15:themeFamily xmlns:thm15="http://schemas.microsoft.com/office/thememl/2012/main" name="Office Theme" id="{62F939B6-93AF-4DB8-9C6B-D6C7DFDC589F}" vid="{4A3C46E8-61CC-4603-A589-7422A47A8E4A}"/>
+    </a:ext>
+  </a:extLst>
 </a:theme>
 </file>
</xml_diff>

<commit_message>
formatting and code review fixes
</commit_message>
<xml_diff>
--- a/samples/pptx/sample.pptx
+++ b/samples/pptx/sample.pptx
@@ -3490,7 +3490,6 @@
               <a:t>Its great!</a:t>
             </a:r>
           </a:p>
-          <!--<a:endParaRPr lang="en-US"/>-->
           <a:p>
             <a:pPr marL="0" indent="0">
               <a:spcBef>
@@ -3502,7 +3501,6 @@
               <a:t>Its sweet!</a:t>
             </a:r>
           </a:p>
-          <!--<a:endParaRPr lang="en-US"/>-->
         </p:txBody>
       </p:sp>
     </p:spTree>
@@ -3650,7 +3648,6 @@
               <a:t>long description line goes here</a:t>
             </a:r>
           </a:p>
-          <!--<a:endParaRPr lang="en-US"/>-->
         </p:txBody>
       </p:sp>
       <p:sp>
@@ -3689,7 +3686,6 @@
               <a:t>bar</a:t>
             </a:r>
           </a:p>
-          <!--<a:endParaRPr lang="en-US"/>-->
           <a:p>
             <a:pPr marL="0" indent="0">
               <a:spcBef>
@@ -3699,10 +3695,13 @@
             </a:pPr>
             <a:r>
               <a:rPr dirty="0" lang="en-US" smtClean="0"/>
-              <a:t>baz◼</a:t>
-            </a:r>
-          </a:p>
-          <!--<a:endParaRPr lang="en-US"/>-->
+              <a:t>baz</a:t>
+            </a:r>
+            <a:r>
+              <a:rPr dirty="0" lang="en-US" smtClean="0"/>
+              <a:t>◼</a:t>
+            </a:r>
+          </a:p>
         </p:txBody>
       </p:sp>
     </p:spTree>
@@ -3783,7 +3782,6 @@
               <a:t>Its cool!</a:t>
             </a:r>
           </a:p>
-          <!--<a:endParaRPr lang="en-US"/>-->
           <a:p>
             <a:pPr marL="0" indent="0">
               <a:spcBef>
@@ -3795,7 +3793,6 @@
               <a:t>Its light!</a:t>
             </a:r>
           </a:p>
-          <!--<a:endParaRPr lang="en-US"/>-->
         </p:txBody>
       </p:sp>
     </p:spTree>
@@ -3876,7 +3873,6 @@
               <a:t>Its fast!</a:t>
             </a:r>
           </a:p>
-          <!--<a:endParaRPr lang="en-US"/>-->
           <a:p>
             <a:pPr marL="0" indent="0">
               <a:spcBef>
@@ -3888,7 +3884,6 @@
               <a:t>Its cheap!</a:t>
             </a:r>
           </a:p>
-          <!--<a:endParaRPr lang="en-US"/>-->
         </p:txBody>
       </p:sp>
     </p:spTree>
@@ -4057,7 +4052,6 @@
               <a:t>Here is a string</a:t>
             </a:r>
           </a:p>
-          <!--<a:endParaRPr lang="en-US"/>-->
           <a:p>
             <a:pPr marL="0" indent="0">
               <a:spcBef>
@@ -4070,7 +4064,6 @@
               <a:t>here is another</a:t>
             </a:r>
           </a:p>
-          <!--<a:endParaRPr lang="en-US"/>-->
         </p:txBody>
       </p:sp>
       <p:pic>
@@ -4300,7 +4293,6 @@
               <a:t>Here is a string</a:t>
             </a:r>
           </a:p>
-          <!--<a:endParaRPr lang="en-US"/>-->
           <a:p>
             <a:pPr marL="0" indent="0">
               <a:spcBef>
@@ -4312,7 +4304,6 @@
               <a:t>here is another</a:t>
             </a:r>
           </a:p>
-          <!--<a:endParaRPr lang="en-US"/>-->
         </p:txBody>
       </p:sp>
     </p:spTree>
@@ -4425,7 +4416,6 @@
               <a:t>descriptions</a:t>
             </a:r>
           </a:p>
-          <!--<a:endParaRPr lang="en-US"/>-->
         </p:txBody>
       </p:sp>
     </p:spTree>
@@ -4538,7 +4528,6 @@
               <a:t>things</a:t>
             </a:r>
           </a:p>
-          <!--<a:endParaRPr lang="en-US"/>-->
         </p:txBody>
       </p:sp>
     </p:spTree>

</xml_diff>

<commit_message>
cell datastructure and merging to support pivot table formatting
</commit_message>
<xml_diff>
--- a/samples/pptx/sample.pptx
+++ b/samples/pptx/sample.pptx
@@ -17,6 +17,7 @@
     <p:sldId id="265" r:id="rId15"/>
     <p:sldId id="266" r:id="rId16"/>
     <p:sldId id="267" r:id="rId17"/>
+    <p:sldId id="268" r:id="rId18"/>
   </p:sldIdLst>
   <p:sldSz cx="12192000" cy="6858000"/>
   <p:notesSz cx="6858000" cy="9144000"/>
@@ -3717,6 +3718,332 @@
 </p:sld>
 </file>
 
+<file path=ppt/slides/slide13.xml><?xml version="1.0" encoding="utf-8"?>
+<p:sld xmlns:a="http://schemas.openxmlformats.org/drawingml/2006/main" xmlns:p="http://schemas.openxmlformats.org/presentationml/2006/main" xmlns:r="http://schemas.openxmlformats.org/officeDocument/2006/relationships">
+  <p:cSld>
+    <p:spTree>
+      <p:nvGrpSpPr>
+        <p:cNvPr id="1" name=""/>
+        <p:cNvGrpSpPr/>
+        <p:nvPr/>
+      </p:nvGrpSpPr>
+      <p:grpSpPr>
+        <a:xfrm>
+          <a:off x="0" y="0"/>
+          <a:ext cx="0" cy="0"/>
+          <a:chOff x="0" y="0"/>
+          <a:chExt cx="0" cy="0"/>
+        </a:xfrm>
+      </p:grpSpPr>
+      <p:sp>
+        <p:nvSpPr>
+          <p:cNvPr id="2" name="Title 1"/>
+          <p:cNvSpPr>
+            <a:spLocks noGrp="1"/>
+          </p:cNvSpPr>
+          <p:nvPr>
+            <p:ph type="title"/>
+          </p:nvPr>
+        </p:nvSpPr>
+        <p:spPr/>
+        <p:txBody>
+          <a:bodyPr/>
+          <a:lstStyle/>
+          <a:p>
+            <a:r>
+              <a:rPr dirty="0" lang="en-US" smtClean="0"/>
+              <a:t>foo bar slide</a:t>
+            </a:r>
+            <a:endParaRPr dirty="0" lang="en-US"/>
+          </a:p>
+        </p:txBody>
+      </p:sp>
+      <p:graphicFrame>
+        <p:nvGraphicFramePr>
+          <p:cNvPr id="10" name="Content Placeholder 3"/>
+          <p:cNvGraphicFramePr>
+            <a:graphicFrameLocks noGrp="1"/>
+          </p:cNvGraphicFramePr>
+          <p:nvPr>
+            <p:ph idx="14"/>
+            <p:extLst>
+              <p:ext uri="{D42A27DB-BD31-4B8C-83A1-F6EECF244321}">
+                <p14:modId xmlns:p14="http://schemas.microsoft.com/office/powerpoint/2010/main" val="1809140355"/>
+              </p:ext>
+            </p:extLst>
+          </p:nvPr>
+        </p:nvGraphicFramePr>
+        <p:xfrm>
+          <a:off x="838200" y="1825625"/>
+          <a:ext cx="10515600" cy="1112520"/>
+        </p:xfrm>
+        <a:graphic>
+          <a:graphicData uri="http://schemas.openxmlformats.org/drawingml/2006/table">
+            <a:tbl>
+              <a:tblPr firstRow="1" bandRow="1">
+                <a:tableStyleId>{5C22544A-7EE6-4342-B048-85BDC9FD1C3A}</a:tableStyleId>
+              </a:tblPr>
+              <a:tblGrid>
+                <a:gridCol w="750000"/>
+                <a:gridCol w="750000"/>
+                <a:gridCol w="750000"/>
+                <a:gridCol w="750000"/>
+              </a:tblGrid>
+              <a:tr h="250000">
+                <a:tc gridSpan="3" rowSpan="2">
+                  <a:txBody>
+                    <a:bodyPr/>
+                    <a:lstStyle/>
+                    <a:p>
+                      <a:r>
+                        <a:rPr lang="en-US" sz="1200" dirty="0" smtClean="0"/>
+                        <a:t>topleft</a:t>
+                      </a:r>
+                      <a:endParaRPr dirty="0" lang="en-US"/>
+                    </a:p>
+                  </a:txBody>
+                  <a:tcPr/>
+                </a:tc>
+                <a:tc rowSpan="2" hMerge="1">
+                  <a:txBody>
+                    <a:bodyPr/>
+                    <a:lstStyle/>
+                    <a:p>
+                      <a:endParaRPr dirty="0" lang="en-US"/>
+                    </a:p>
+                  </a:txBody>
+                  <a:tcPr/>
+                </a:tc>
+                <a:tc rowSpan="2" hMerge="1">
+                  <a:txBody>
+                    <a:bodyPr/>
+                    <a:lstStyle/>
+                    <a:p>
+                      <a:endParaRPr dirty="0" lang="en-US"/>
+                    </a:p>
+                  </a:txBody>
+                  <a:tcPr/>
+                </a:tc>
+                <a:tc>
+                  <a:txBody>
+                    <a:bodyPr/>
+                    <a:lstStyle/>
+                    <a:p>
+                      <a:r>
+                        <a:rPr lang="en-US" sz="1200" dirty="0" smtClean="0"/>
+                        <a:t>topright1</a:t>
+                      </a:r>
+                      <a:endParaRPr dirty="0" lang="en-US"/>
+                    </a:p>
+                  </a:txBody>
+                  <a:tcPr/>
+                </a:tc>
+              </a:tr>
+              <a:tr h="250000">
+                <a:tc gridSpan="3" vMerge="1">
+                  <a:txBody>
+                    <a:bodyPr/>
+                    <a:lstStyle/>
+                    <a:p>
+                      <a:endParaRPr dirty="0" lang="en-US"/>
+                    </a:p>
+                  </a:txBody>
+                  <a:tcPr/>
+                </a:tc>
+                <a:tc hMerge="1" vMerge="1">
+                  <a:txBody>
+                    <a:bodyPr/>
+                    <a:lstStyle/>
+                    <a:p>
+                      <a:endParaRPr dirty="0" lang="en-US"/>
+                    </a:p>
+                  </a:txBody>
+                  <a:tcPr/>
+                </a:tc>
+                <a:tc hMerge="1" vMerge="1">
+                  <a:txBody>
+                    <a:bodyPr/>
+                    <a:lstStyle/>
+                    <a:p>
+                      <a:endParaRPr dirty="0" lang="en-US"/>
+                    </a:p>
+                  </a:txBody>
+                  <a:tcPr/>
+                </a:tc>
+                <a:tc>
+                  <a:txBody>
+                    <a:bodyPr/>
+                    <a:lstStyle/>
+                    <a:p>
+                      <a:r>
+                        <a:rPr lang="en-US" sz="1200" dirty="0" smtClean="0"/>
+                        <a:t>topright2</a:t>
+                      </a:r>
+                      <a:endParaRPr dirty="0" lang="en-US"/>
+                    </a:p>
+                  </a:txBody>
+                  <a:tcPr/>
+                </a:tc>
+              </a:tr>
+              <a:tr h="250000">
+                <a:tc>
+                  <a:txBody>
+                    <a:bodyPr/>
+                    <a:lstStyle/>
+                    <a:p>
+                      <a:r>
+                        <a:rPr lang="en-US" sz="1200" dirty="0" smtClean="0"/>
+                        <a:t>botleft1</a:t>
+                      </a:r>
+                      <a:endParaRPr dirty="0" lang="en-US"/>
+                    </a:p>
+                  </a:txBody>
+                  <a:tcPr/>
+                </a:tc>
+                <a:tc>
+                  <a:txBody>
+                    <a:bodyPr/>
+                    <a:lstStyle/>
+                    <a:p>
+                      <a:r>
+                        <a:rPr lang="en-US" sz="1200" dirty="0" smtClean="0"/>
+                        <a:t>botleft2</a:t>
+                      </a:r>
+                      <a:endParaRPr dirty="0" lang="en-US"/>
+                    </a:p>
+                  </a:txBody>
+                  <a:tcPr/>
+                </a:tc>
+                <a:tc>
+                  <a:txBody>
+                    <a:bodyPr/>
+                    <a:lstStyle/>
+                    <a:p>
+                      <a:r>
+                        <a:rPr lang="en-US" sz="1200" dirty="0" smtClean="0"/>
+                        <a:t>botleft3</a:t>
+                      </a:r>
+                      <a:endParaRPr dirty="0" lang="en-US"/>
+                    </a:p>
+                  </a:txBody>
+                  <a:tcPr/>
+                </a:tc>
+                <a:tc>
+                  <a:txBody>
+                    <a:bodyPr/>
+                    <a:lstStyle/>
+                    <a:p>
+                      <a:r>
+                        <a:rPr lang="en-US" sz="1200" dirty="0" smtClean="0"/>
+                        <a:t>botright</a:t>
+                      </a:r>
+                      <a:endParaRPr dirty="0" lang="en-US"/>
+                    </a:p>
+                  </a:txBody>
+                  <a:tcPr/>
+                </a:tc>
+              </a:tr>
+            </a:tbl>
+          </a:graphicData>
+        </a:graphic>
+      </p:graphicFrame>
+      <p:sp>
+        <p:nvSpPr>
+          <p:cNvPr id="11" name="Content Placeholder 2"/>
+          <p:cNvSpPr>
+            <a:spLocks noGrp="1"/>
+          </p:cNvSpPr>
+          <p:nvPr>
+            <p:ph idx="13"/>
+          </p:nvPr>
+        </p:nvSpPr>
+        <p:spPr/>
+        <p:txBody>
+          <a:bodyPr>
+            <a:normAutofit/>
+          </a:bodyPr>
+          <a:lstStyle/>
+          <a:p>
+            <a:pPr marL="0" indent="0">
+              <a:spcBef>
+                <a:spcPts val="0"/>
+              </a:spcBef>
+              <a:buNone/>
+            </a:pPr>
+            <a:r>
+              <a:rPr dirty="0" lang="en-US" smtClean="0"/>
+              <a:t>long description line goes here</a:t>
+            </a:r>
+          </a:p>
+        </p:txBody>
+      </p:sp>
+      <p:sp>
+        <p:nvSpPr>
+          <p:cNvPr id="12" name="Content Placeholder 2"/>
+          <p:cNvSpPr>
+            <a:spLocks noGrp="1"/>
+          </p:cNvSpPr>
+          <p:nvPr>
+            <p:ph idx="16"/>
+          </p:nvPr>
+        </p:nvSpPr>
+        <p:spPr/>
+        <p:txBody>
+          <a:bodyPr>
+            <a:normAutofit/>
+          </a:bodyPr>
+          <a:lstStyle/>
+          <a:p>
+            <a:pPr marL="0" indent="0">
+              <a:spcBef>
+                <a:spcPts val="0"/>
+              </a:spcBef>
+              <a:buNone/>
+            </a:pPr>
+            <a:r>
+              <a:rPr dirty="0" lang="en-US" sz="2400" smtClean="0">
+                <a:solidFill>
+                  <a:srgbClr val="2d97d3"/>
+                </a:solidFill>
+              </a:rPr>
+              <a:t>foo</a:t>
+            </a:r>
+            <a:r>
+              <a:rPr dirty="0" lang="en-US" smtClean="0"/>
+              <a:t>bar</a:t>
+            </a:r>
+          </a:p>
+          <a:p>
+            <a:pPr marL="0" indent="0">
+              <a:spcBef>
+                <a:spcPts val="0"/>
+              </a:spcBef>
+              <a:buNone/>
+            </a:pPr>
+            <a:r>
+              <a:rPr dirty="0" lang="en-US" b="1" smtClean="0"/>
+              <a:t>baz</a:t>
+            </a:r>
+            <a:r>
+              <a:rPr dirty="0" lang="en-US" smtClean="0"/>
+              <a:t>◼</a:t>
+            </a:r>
+          </a:p>
+        </p:txBody>
+      </p:sp>
+    </p:spTree>
+    <p:extLst>
+      <p:ext uri="{BB962C8B-B14F-4D97-AF65-F5344CB8AC3E}">
+        <p14:creationId xmlns:p14="http://schemas.microsoft.com/office/powerpoint/2010/main" val="1231192379"/>
+      </p:ext>
+    </p:extLst>
+  </p:cSld>
+  <p:clrMapOvr>
+    <a:masterClrMapping/>
+  </p:clrMapOvr>
+</p:sld>
+</file>
+
 <file path=ppt/slides/slide2.xml><?xml version="1.0" encoding="utf-8"?>
 <p:sld xmlns:a="http://schemas.openxmlformats.org/drawingml/2006/main" xmlns:p="http://schemas.openxmlformats.org/presentationml/2006/main" xmlns:r="http://schemas.openxmlformats.org/officeDocument/2006/relationships">
   <p:cSld>

</xml_diff>

<commit_message>
escape text in templates
</commit_message>
<xml_diff>
--- a/samples/pptx/sample.pptx
+++ b/samples/pptx/sample.pptx
@@ -3299,7 +3299,7 @@
           <a:p>
             <a:r>
               <a:rPr dirty="0" lang="en-US" smtClean="0"/>
-              <a:t>Bicycle Of the Mind</a:t>
+              <a:t>Bicycle Of the Mind&gt;</a:t>
             </a:r>
             <a:endParaRPr dirty="0" lang="en-US"/>
           </a:p>
@@ -3375,7 +3375,7 @@
           <a:p>
             <a:r>
               <a:rPr dirty="0" lang="en-US" smtClean="0"/>
-              <a:t>GIF Logo</a:t>
+              <a:t>GIF Logo&gt;</a:t>
             </a:r>
             <a:endParaRPr dirty="0" lang="en-US"/>
           </a:p>
@@ -3460,7 +3460,7 @@
           <a:p>
             <a:r>
               <a:rPr dirty="0" lang="en-US" smtClean="0"/>
-              <a:t>Why Android?</a:t>
+              <a:t>Why Android?&gt;</a:t>
             </a:r>
             <a:endParaRPr dirty="0" lang="en-US"/>
           </a:p>
@@ -3488,7 +3488,7 @@
             </a:pPr>
             <a:r>
               <a:rPr dirty="0" lang="en-US" smtClean="0"/>
-              <a:t>Its great!</a:t>
+              <a:t>Its great&amp;!</a:t>
             </a:r>
           </a:p>
           <a:p>
@@ -3700,7 +3700,7 @@
             </a:r>
             <a:r>
               <a:rPr dirty="0" lang="en-US" smtClean="0"/>
-              <a:t>◼</a:t>
+              <a:t>&amp;◼</a:t>
             </a:r>
           </a:p>
         </p:txBody>
@@ -3781,7 +3781,7 @@
           <a:graphicData uri="http://schemas.openxmlformats.org/drawingml/2006/table">
             <a:tbl>
               <a:tblPr firstRow="1" bandRow="1">
-                <a:tableStyleId>{5C22544A-7EE6-4342-B048-85BDC9FD1C3A}</a:tableStyleId>
+                <a:tableStyleId>{28A0092B-C50C-407E-A947-70E740481C1C}</a:tableStyleId>
               </a:tblPr>
               <a:tblGrid>
                 <a:gridCol w="750000"/>
@@ -3797,12 +3797,16 @@
                     <a:p>
                       <a:r>
                         <a:rPr lang="en-US" sz="1200" dirty="0" smtClean="0"/>
-                        <a:t>topleft</a:t>
+                        <a:t>top&amp;left</a:t>
                       </a:r>
                       <a:endParaRPr dirty="0" lang="en-US"/>
                     </a:p>
                   </a:txBody>
-                  <a:tcPr/>
+                  <a:tcPr>
+                    <a:solidFill>
+                      <a:srgbClr val="FFFF00"/>
+                    </a:solidFill>
+                  </a:tcPr>
                 </a:tc>
                 <a:tc rowSpan="2" hMerge="1">
                   <a:txBody>
@@ -3812,7 +3816,11 @@
                       <a:endParaRPr dirty="0" lang="en-US"/>
                     </a:p>
                   </a:txBody>
-                  <a:tcPr/>
+                  <a:tcPr>
+                    <a:solidFill>
+                      <a:srgbClr val="FFFF00"/>
+                    </a:solidFill>
+                  </a:tcPr>
                 </a:tc>
                 <a:tc rowSpan="2" hMerge="1">
                   <a:txBody>
@@ -3822,7 +3830,11 @@
                       <a:endParaRPr dirty="0" lang="en-US"/>
                     </a:p>
                   </a:txBody>
-                  <a:tcPr/>
+                  <a:tcPr>
+                    <a:solidFill>
+                      <a:srgbClr val="FFFF00"/>
+                    </a:solidFill>
+                  </a:tcPr>
                 </a:tc>
                 <a:tc>
                   <a:txBody>
@@ -3831,7 +3843,7 @@
                     <a:p>
                       <a:r>
                         <a:rPr lang="en-US" sz="1200" dirty="0" smtClean="0"/>
-                        <a:t>topright1</a:t>
+                        <a:t>top&gt;right1</a:t>
                       </a:r>
                       <a:endParaRPr dirty="0" lang="en-US"/>
                     </a:p>
@@ -3848,7 +3860,11 @@
                       <a:endParaRPr dirty="0" lang="en-US"/>
                     </a:p>
                   </a:txBody>
-                  <a:tcPr/>
+                  <a:tcPr>
+                    <a:solidFill>
+                      <a:srgbClr val="FFFF00"/>
+                    </a:solidFill>
+                  </a:tcPr>
                 </a:tc>
                 <a:tc hMerge="1" vMerge="1">
                   <a:txBody>
@@ -3858,7 +3874,11 @@
                       <a:endParaRPr dirty="0" lang="en-US"/>
                     </a:p>
                   </a:txBody>
-                  <a:tcPr/>
+                  <a:tcPr>
+                    <a:solidFill>
+                      <a:srgbClr val="FFFF00"/>
+                    </a:solidFill>
+                  </a:tcPr>
                 </a:tc>
                 <a:tc hMerge="1" vMerge="1">
                   <a:txBody>
@@ -3868,7 +3888,11 @@
                       <a:endParaRPr dirty="0" lang="en-US"/>
                     </a:p>
                   </a:txBody>
-                  <a:tcPr/>
+                  <a:tcPr>
+                    <a:solidFill>
+                      <a:srgbClr val="FFFF00"/>
+                    </a:solidFill>
+                  </a:tcPr>
                 </a:tc>
                 <a:tc>
                   <a:txBody>
@@ -3877,7 +3901,7 @@
                     <a:p>
                       <a:r>
                         <a:rPr lang="en-US" sz="1200" dirty="0" smtClean="0"/>
-                        <a:t>topright2</a:t>
+                        <a:t>top&amp;right2</a:t>
                       </a:r>
                       <a:endParaRPr dirty="0" lang="en-US"/>
                     </a:p>
@@ -3893,7 +3917,7 @@
                     <a:p>
                       <a:r>
                         <a:rPr lang="en-US" sz="1200" dirty="0" smtClean="0"/>
-                        <a:t>botleft1</a:t>
+                        <a:t>bot&amp;left1</a:t>
                       </a:r>
                       <a:endParaRPr dirty="0" lang="en-US"/>
                     </a:p>
@@ -3907,7 +3931,7 @@
                     <a:p>
                       <a:r>
                         <a:rPr lang="en-US" sz="1200" dirty="0" smtClean="0"/>
-                        <a:t>botleft2</a:t>
+                        <a:t>bot&amp;left2</a:t>
                       </a:r>
                       <a:endParaRPr dirty="0" lang="en-US"/>
                     </a:p>
@@ -3921,7 +3945,7 @@
                     <a:p>
                       <a:r>
                         <a:rPr lang="en-US" sz="1200" dirty="0" smtClean="0"/>
-                        <a:t>botleft3</a:t>
+                        <a:t>bot&amp;left3</a:t>
                       </a:r>
                       <a:endParaRPr dirty="0" lang="en-US"/>
                     </a:p>
@@ -3935,7 +3959,7 @@
                     <a:p>
                       <a:r>
                         <a:rPr lang="en-US" sz="1200" dirty="0" smtClean="0"/>
-                        <a:t>botright</a:t>
+                        <a:t>bot&amp;right</a:t>
                       </a:r>
                       <a:endParaRPr dirty="0" lang="en-US"/>
                     </a:p>
@@ -4078,7 +4102,7 @@
           <a:p>
             <a:r>
               <a:rPr dirty="0" lang="en-US" smtClean="0"/>
-              <a:t>Why Mac?</a:t>
+              <a:t>Why Mac?&gt;</a:t>
             </a:r>
             <a:endParaRPr dirty="0" lang="en-US"/>
           </a:p>
@@ -4169,7 +4193,7 @@
           <a:p>
             <a:r>
               <a:rPr dirty="0" lang="en-US" smtClean="0"/>
-              <a:t>Why Iphone?</a:t>
+              <a:t>Why Iphone?&gt;</a:t>
             </a:r>
             <a:endParaRPr dirty="0" lang="en-US"/>
           </a:p>
@@ -4260,7 +4284,7 @@
           <a:p>
             <a:r>
               <a:rPr dirty="0" lang="en-US" smtClean="0"/>
-              <a:t>JPG Logo</a:t>
+              <a:t>JPG Logo&gt;</a:t>
             </a:r>
             <a:endParaRPr dirty="0" lang="en-US"/>
           </a:p>
@@ -4345,7 +4369,7 @@
           <a:p>
             <a:r>
               <a:rPr dirty="0" lang="en-US" smtClean="0"/>
-              <a:t>Text Pic Split</a:t>
+              <a:t>Text Pic Split&gt;</a:t>
             </a:r>
             <a:endParaRPr dirty="0" lang="en-US"/>
           </a:p>
@@ -4472,7 +4496,7 @@
           <a:p>
             <a:r>
               <a:rPr dirty="0" lang="en-US" smtClean="0"/>
-              <a:t>PNG Logo</a:t>
+              <a:t>PNG Logo&gt;</a:t>
             </a:r>
             <a:endParaRPr dirty="0" lang="en-US"/>
           </a:p>
@@ -4557,7 +4581,7 @@
           <a:p>
             <a:r>
               <a:rPr dirty="0" lang="en-US" smtClean="0"/>
-              <a:t>Pic Desc</a:t>
+              <a:t>Pic Desc&gt;</a:t>
             </a:r>
             <a:endParaRPr dirty="0" lang="en-US"/>
           </a:p>
@@ -4680,7 +4704,7 @@
           <a:p>
             <a:r>
               <a:rPr dirty="0" lang="en-US" smtClean="0"/>
-              <a:t>JPG Logo</a:t>
+              <a:t>JPG Logo&gt;</a:t>
             </a:r>
             <a:endParaRPr dirty="0" lang="en-US"/>
           </a:p>
@@ -4792,7 +4816,7 @@
           <a:p>
             <a:r>
               <a:rPr dirty="0" lang="en-US" smtClean="0"/>
-              <a:t>another</a:t>
+              <a:t>another&gt;</a:t>
             </a:r>
             <a:endParaRPr dirty="0" lang="en-US"/>
           </a:p>

</xml_diff>